<commit_message>
physics week 6 slides
</commit_message>
<xml_diff>
--- a/mod4_wk6/phy_wk6_mod4_part1.pptx
+++ b/mod4_wk6/phy_wk6_mod4_part1.pptx
@@ -5,10 +5,10 @@
     <p:sldMasterId id="2147483660" r:id="rId1"/>
   </p:sldMasterIdLst>
   <p:notesMasterIdLst>
-    <p:notesMasterId r:id="rId23"/>
+    <p:notesMasterId r:id="rId26"/>
   </p:notesMasterIdLst>
   <p:handoutMasterIdLst>
-    <p:handoutMasterId r:id="rId24"/>
+    <p:handoutMasterId r:id="rId27"/>
   </p:handoutMasterIdLst>
   <p:sldIdLst>
     <p:sldId id="256" r:id="rId2"/>
@@ -26,12 +26,15 @@
     <p:sldId id="387" r:id="rId14"/>
     <p:sldId id="388" r:id="rId15"/>
     <p:sldId id="389" r:id="rId16"/>
-    <p:sldId id="390" r:id="rId17"/>
-    <p:sldId id="391" r:id="rId18"/>
-    <p:sldId id="392" r:id="rId19"/>
-    <p:sldId id="393" r:id="rId20"/>
-    <p:sldId id="394" r:id="rId21"/>
-    <p:sldId id="395" r:id="rId22"/>
+    <p:sldId id="396" r:id="rId17"/>
+    <p:sldId id="390" r:id="rId18"/>
+    <p:sldId id="391" r:id="rId19"/>
+    <p:sldId id="394" r:id="rId20"/>
+    <p:sldId id="398" r:id="rId21"/>
+    <p:sldId id="400" r:id="rId22"/>
+    <p:sldId id="401" r:id="rId23"/>
+    <p:sldId id="402" r:id="rId24"/>
+    <p:sldId id="403" r:id="rId25"/>
   </p:sldIdLst>
   <p:sldSz cx="9144000" cy="6858000" type="screen4x3"/>
   <p:notesSz cx="7010400" cy="9296400"/>
@@ -228,7 +231,7 @@
             </a:lvl1pPr>
           </a:lstStyle>
           <a:p>
-            <a:endParaRPr lang="en-US"/>
+            <a:endParaRPr lang="en-US" dirty="0"/>
           </a:p>
         </p:txBody>
       </p:sp>
@@ -261,9 +264,9 @@
           <a:p>
             <a:fld id="{59C9DB83-C1E6-45E0-BE1A-95D51F1217A8}" type="datetimeFigureOut">
               <a:rPr lang="en-US" smtClean="0"/>
-              <a:t>7/16/2016</a:t>
+              <a:t>7/19/2016</a:t>
             </a:fld>
-            <a:endParaRPr lang="en-US"/>
+            <a:endParaRPr lang="en-US" dirty="0"/>
           </a:p>
         </p:txBody>
       </p:sp>
@@ -294,7 +297,7 @@
             </a:lvl1pPr>
           </a:lstStyle>
           <a:p>
-            <a:endParaRPr lang="en-US"/>
+            <a:endParaRPr lang="en-US" dirty="0"/>
           </a:p>
         </p:txBody>
       </p:sp>
@@ -329,7 +332,7 @@
               <a:rPr lang="en-US" smtClean="0"/>
               <a:t>‹#›</a:t>
             </a:fld>
-            <a:endParaRPr lang="en-US"/>
+            <a:endParaRPr lang="en-US" dirty="0"/>
           </a:p>
         </p:txBody>
       </p:sp>
@@ -427,7 +430,7 @@
             <a:fld id="{E7A1523E-516C-4467-973B-9EEA307F4481}" type="datetimeFigureOut">
               <a:rPr lang="en-US" smtClean="0"/>
               <a:pPr/>
-              <a:t>7/16/2016</a:t>
+              <a:t>7/19/2016</a:t>
             </a:fld>
             <a:endParaRPr lang="en-US" dirty="0"/>
           </a:p>
@@ -736,7 +739,7 @@
               <a:pPr/>
               <a:t>11</a:t>
             </a:fld>
-            <a:endParaRPr lang="en-US" altLang="en-US"/>
+            <a:endParaRPr lang="en-US" altLang="en-US" dirty="0"/>
           </a:p>
         </p:txBody>
       </p:sp>
@@ -806,14 +809,14 @@
           <a:lstStyle/>
           <a:p>
             <a:r>
-              <a:rPr lang="en-US" altLang="en-US">
+              <a:rPr lang="en-US" altLang="en-US" dirty="0">
                 <a:ea typeface="Batang" pitchFamily="18" charset="-127"/>
               </a:rPr>
               <a:t>A.   positive.</a:t>
             </a:r>
           </a:p>
           <a:p>
-            <a:endParaRPr lang="en-US" altLang="en-US"/>
+            <a:endParaRPr lang="en-US" altLang="en-US" dirty="0"/>
           </a:p>
         </p:txBody>
       </p:sp>
@@ -869,7 +872,7 @@
               <a:pPr/>
               <a:t>12</a:t>
             </a:fld>
-            <a:endParaRPr lang="en-US" altLang="en-US"/>
+            <a:endParaRPr lang="en-US" altLang="en-US" dirty="0"/>
           </a:p>
         </p:txBody>
       </p:sp>
@@ -939,14 +942,14 @@
           <a:lstStyle/>
           <a:p>
             <a:r>
-              <a:rPr lang="en-US" altLang="en-US">
+              <a:rPr lang="en-US" altLang="en-US" dirty="0">
                 <a:ea typeface="Batang" pitchFamily="18" charset="-127"/>
               </a:rPr>
               <a:t>A.   positive.</a:t>
             </a:r>
           </a:p>
           <a:p>
-            <a:endParaRPr lang="en-US" altLang="en-US"/>
+            <a:endParaRPr lang="en-US" altLang="en-US" dirty="0"/>
           </a:p>
         </p:txBody>
       </p:sp>
@@ -1000,9 +1003,9 @@
             <a:fld id="{D6AFEDA8-46D0-4918-8A0E-32F9E317836B}" type="slidenum">
               <a:rPr lang="en-US" altLang="en-US"/>
               <a:pPr/>
-              <a:t>16</a:t>
+              <a:t>17</a:t>
             </a:fld>
-            <a:endParaRPr lang="en-US" altLang="en-US"/>
+            <a:endParaRPr lang="en-US" altLang="en-US" dirty="0"/>
           </a:p>
         </p:txBody>
       </p:sp>
@@ -1072,14 +1075,14 @@
           <a:lstStyle/>
           <a:p>
             <a:r>
-              <a:rPr lang="en-US" altLang="en-US">
+              <a:rPr lang="en-US" altLang="en-US" dirty="0">
                 <a:ea typeface="Batang" pitchFamily="18" charset="-127"/>
               </a:rPr>
               <a:t>B.   one quarter as strong.</a:t>
             </a:r>
           </a:p>
           <a:p>
-            <a:endParaRPr lang="en-US" altLang="en-US"/>
+            <a:endParaRPr lang="en-US" altLang="en-US" dirty="0"/>
           </a:p>
         </p:txBody>
       </p:sp>
@@ -1133,9 +1136,9 @@
             <a:fld id="{AA6D72FA-1F44-48DA-BE9E-157944C20EA1}" type="slidenum">
               <a:rPr lang="en-US" altLang="en-US"/>
               <a:pPr/>
-              <a:t>17</a:t>
+              <a:t>18</a:t>
             </a:fld>
-            <a:endParaRPr lang="en-US" altLang="en-US"/>
+            <a:endParaRPr lang="en-US" altLang="en-US" dirty="0"/>
           </a:p>
         </p:txBody>
       </p:sp>
@@ -1205,14 +1208,14 @@
           <a:lstStyle/>
           <a:p>
             <a:r>
-              <a:rPr lang="en-US" altLang="en-US">
+              <a:rPr lang="en-US" altLang="en-US" dirty="0">
                 <a:ea typeface="Batang" pitchFamily="18" charset="-127"/>
               </a:rPr>
               <a:t>B.   one quarter as strong.</a:t>
             </a:r>
           </a:p>
           <a:p>
-            <a:endParaRPr lang="en-US" altLang="en-US"/>
+            <a:endParaRPr lang="en-US" altLang="en-US" dirty="0"/>
           </a:p>
         </p:txBody>
       </p:sp>
@@ -4908,7 +4911,7 @@
           <a:lstStyle/>
           <a:p>
             <a:r>
-              <a:rPr lang="en-US" altLang="en-US"/>
+              <a:rPr lang="en-US" altLang="en-US" dirty="0"/>
               <a:t>Electric Force and Charge</a:t>
             </a:r>
           </a:p>
@@ -4924,7 +4927,12 @@
             <p:ph type="body" idx="1"/>
           </p:nvPr>
         </p:nvSpPr>
-        <p:spPr/>
+        <p:spPr>
+          <a:xfrm>
+            <a:off x="457200" y="1219200"/>
+            <a:ext cx="8229600" cy="4530725"/>
+          </a:xfrm>
+        </p:spPr>
         <p:txBody>
           <a:bodyPr/>
           <a:lstStyle/>
@@ -4934,7 +4942,7 @@
               <a:buNone/>
             </a:pPr>
             <a:r>
-              <a:rPr lang="en-US" altLang="en-US"/>
+              <a:rPr lang="en-US" altLang="en-US" dirty="0"/>
               <a:t>Electrons in an atom</a:t>
             </a:r>
           </a:p>
@@ -4944,7 +4952,7 @@
               <a:buNone/>
             </a:pPr>
             <a:r>
-              <a:rPr lang="en-US" altLang="en-US" sz="2800"/>
+              <a:rPr lang="en-US" altLang="en-US" sz="2800" dirty="0"/>
               <a:t>	Examples:</a:t>
             </a:r>
           </a:p>
@@ -4954,7 +4962,7 @@
               <a:buChar char="•"/>
             </a:pPr>
             <a:r>
-              <a:rPr lang="en-US" altLang="en-US" sz="2400"/>
+              <a:rPr lang="en-US" altLang="en-US" sz="2400" dirty="0"/>
               <a:t>When rubbing a comb through your hair, electrons transfer from your hair to the comb. Your hair has a deficiency of electrons (positively charged).</a:t>
             </a:r>
           </a:p>
@@ -4964,7 +4972,7 @@
               <a:buChar char="•"/>
             </a:pPr>
             <a:r>
-              <a:rPr lang="en-US" altLang="en-US" sz="2400"/>
+              <a:rPr lang="en-US" altLang="en-US" sz="2400" dirty="0"/>
               <a:t>When rubbing a glass rod with silk, electrons transfer from the rod onto the silk and the rod becomes positively charged.</a:t>
             </a:r>
           </a:p>
@@ -5022,10 +5030,10 @@
           <a:p>
             <a:pPr algn="l"/>
             <a:r>
-              <a:rPr lang="en-US" altLang="en-US" sz="2400"/>
+              <a:rPr lang="en-US" altLang="en-US" sz="2400" dirty="0"/>
               <a:t>When you brush your hair and scrape electrons from your hair, the charge of your hair is</a:t>
             </a:r>
-            <a:endParaRPr lang="en-US" altLang="en-US" sz="2800" b="1" i="1">
+            <a:endParaRPr lang="en-US" altLang="en-US" sz="2800" b="1" i="1" dirty="0">
               <a:latin typeface="Batang" pitchFamily="18" charset="-127"/>
               <a:ea typeface="Batang" pitchFamily="18" charset="-127"/>
             </a:endParaRPr>
@@ -5057,10 +5065,10 @@
               <a:buNone/>
             </a:pPr>
             <a:r>
-              <a:rPr lang="en-US" altLang="en-US" sz="2000"/>
+              <a:rPr lang="en-US" altLang="en-US" sz="2000" dirty="0"/>
               <a:t>A.	positive.</a:t>
             </a:r>
-            <a:endParaRPr lang="en-US" altLang="en-US" sz="2000">
+            <a:endParaRPr lang="en-US" altLang="en-US" sz="2000" dirty="0">
               <a:ea typeface="Batang" pitchFamily="18" charset="-127"/>
             </a:endParaRPr>
           </a:p>
@@ -5070,11 +5078,11 @@
               <a:buAutoNum type="alphaUcPeriod" startAt="2"/>
             </a:pPr>
             <a:r>
-              <a:rPr lang="en-US" altLang="en-US" sz="2000"/>
+              <a:rPr lang="en-US" altLang="en-US" sz="2000" dirty="0"/>
               <a:t>negative.</a:t>
             </a:r>
             <a:r>
-              <a:rPr lang="en-US" altLang="en-US" sz="2000" b="1">
+              <a:rPr lang="en-US" altLang="en-US" sz="2000" b="1" dirty="0">
                 <a:ea typeface="Batang" pitchFamily="18" charset="-127"/>
               </a:rPr>
               <a:t> </a:t>
@@ -5086,10 +5094,10 @@
               <a:buAutoNum type="alphaUcPeriod" startAt="2"/>
             </a:pPr>
             <a:r>
-              <a:rPr lang="en-US" altLang="en-US" sz="2000"/>
+              <a:rPr lang="en-US" altLang="en-US" sz="2000" dirty="0"/>
               <a:t>both A and B</a:t>
             </a:r>
-            <a:endParaRPr lang="en-US" altLang="en-US" sz="2000">
+            <a:endParaRPr lang="en-US" altLang="en-US" sz="2000" dirty="0">
               <a:ea typeface="Batang" pitchFamily="18" charset="-127"/>
             </a:endParaRPr>
           </a:p>
@@ -5099,7 +5107,7 @@
               <a:buAutoNum type="alphaUcPeriod" startAt="4"/>
             </a:pPr>
             <a:r>
-              <a:rPr lang="en-US" altLang="en-US" sz="2000"/>
+              <a:rPr lang="en-US" altLang="en-US" sz="2000" dirty="0"/>
               <a:t>neither A nor B</a:t>
             </a:r>
           </a:p>
@@ -5156,7 +5164,7 @@
           <a:p>
             <a:pPr algn="ctr"/>
             <a:r>
-              <a:rPr lang="en-US" altLang="en-US" sz="2400" b="1">
+              <a:rPr lang="en-US" altLang="en-US" sz="2400" b="1" dirty="0">
                 <a:solidFill>
                   <a:schemeClr val="bg1"/>
                 </a:solidFill>
@@ -5168,7 +5176,7 @@
           <a:p>
             <a:pPr algn="ctr"/>
             <a:r>
-              <a:rPr lang="en-US" altLang="en-US" sz="2400" b="1">
+              <a:rPr lang="en-US" altLang="en-US" sz="2400" b="1" dirty="0">
                 <a:solidFill>
                   <a:schemeClr val="bg1"/>
                 </a:solidFill>
@@ -5177,7 +5185,7 @@
               <a:t>CHECK YOUR NEIGHBOR</a:t>
             </a:r>
             <a:r>
-              <a:rPr lang="en-US" altLang="en-US" sz="2400" b="1" i="1">
+              <a:rPr lang="en-US" altLang="en-US" sz="2400" b="1" i="1" dirty="0">
                 <a:solidFill>
                   <a:schemeClr val="bg1"/>
                 </a:solidFill>
@@ -5240,7 +5248,7 @@
           <a:p>
             <a:pPr algn="l"/>
             <a:r>
-              <a:rPr lang="en-US" altLang="en-US" sz="2400"/>
+              <a:rPr lang="en-US" altLang="en-US" sz="2400" dirty="0"/>
               <a:t>When you brush your hair and scrape electrons from your hair, the charge of your hair is</a:t>
             </a:r>
           </a:p>
@@ -5271,10 +5279,10 @@
               <a:buNone/>
             </a:pPr>
             <a:r>
-              <a:rPr lang="en-US" altLang="en-US" sz="1600" b="1"/>
+              <a:rPr lang="en-US" altLang="en-US" sz="1600" b="1" dirty="0"/>
               <a:t>A.	positive.</a:t>
             </a:r>
-            <a:endParaRPr lang="en-US" altLang="en-US" sz="1600">
+            <a:endParaRPr lang="en-US" altLang="en-US" sz="1600" dirty="0">
               <a:ea typeface="Batang" pitchFamily="18" charset="-127"/>
             </a:endParaRPr>
           </a:p>
@@ -5284,11 +5292,11 @@
               <a:buAutoNum type="alphaUcPeriod" startAt="2"/>
             </a:pPr>
             <a:r>
-              <a:rPr lang="en-US" altLang="en-US" sz="1600"/>
+              <a:rPr lang="en-US" altLang="en-US" sz="1600" dirty="0"/>
               <a:t>negative.</a:t>
             </a:r>
             <a:r>
-              <a:rPr lang="en-US" altLang="en-US" sz="1600" b="1">
+              <a:rPr lang="en-US" altLang="en-US" sz="1600" b="1" dirty="0">
                 <a:ea typeface="Batang" pitchFamily="18" charset="-127"/>
               </a:rPr>
               <a:t> </a:t>
@@ -5300,10 +5308,10 @@
               <a:buAutoNum type="alphaUcPeriod" startAt="2"/>
             </a:pPr>
             <a:r>
-              <a:rPr lang="en-US" altLang="en-US" sz="1600"/>
+              <a:rPr lang="en-US" altLang="en-US" sz="1600" dirty="0"/>
               <a:t>both A and B</a:t>
             </a:r>
-            <a:endParaRPr lang="en-US" altLang="en-US" sz="1600">
+            <a:endParaRPr lang="en-US" altLang="en-US" sz="1600" dirty="0">
               <a:ea typeface="Batang" pitchFamily="18" charset="-127"/>
             </a:endParaRPr>
           </a:p>
@@ -5313,7 +5321,7 @@
               <a:buAutoNum type="alphaUcPeriod" startAt="4"/>
             </a:pPr>
             <a:r>
-              <a:rPr lang="en-US" altLang="en-US" sz="1600"/>
+              <a:rPr lang="en-US" altLang="en-US" sz="1600" dirty="0"/>
               <a:t>neither A nor B</a:t>
             </a:r>
           </a:p>
@@ -5322,7 +5330,7 @@
               <a:buFontTx/>
               <a:buAutoNum type="alphaUcPeriod" startAt="4"/>
             </a:pPr>
-            <a:endParaRPr lang="en-US" altLang="en-US" sz="1600"/>
+            <a:endParaRPr lang="en-US" altLang="en-US" sz="1600" dirty="0"/>
           </a:p>
           <a:p>
             <a:pPr marL="609600" indent="-609600">
@@ -5330,11 +5338,11 @@
               <a:buNone/>
             </a:pPr>
             <a:r>
-              <a:rPr lang="en-US" altLang="en-US" sz="1600" i="1"/>
+              <a:rPr lang="en-US" altLang="en-US" sz="1600" i="1" dirty="0"/>
               <a:t>	Comment</a:t>
             </a:r>
             <a:r>
-              <a:rPr lang="en-US" altLang="en-US" sz="1600"/>
+              <a:rPr lang="en-US" altLang="en-US" sz="1600" dirty="0"/>
               <a:t>:</a:t>
             </a:r>
           </a:p>
@@ -5344,7 +5352,7 @@
               <a:buNone/>
             </a:pPr>
             <a:r>
-              <a:rPr lang="en-US" altLang="en-US" sz="1600"/>
+              <a:rPr lang="en-US" altLang="en-US" sz="1600" dirty="0"/>
               <a:t>	And if electrons were scraped off the brush onto your hair, your hair would have a negative charge.</a:t>
             </a:r>
           </a:p>
@@ -5353,14 +5361,14 @@
               <a:buFontTx/>
               <a:buNone/>
             </a:pPr>
-            <a:endParaRPr lang="en-US" altLang="en-US" sz="1600"/>
+            <a:endParaRPr lang="en-US" altLang="en-US" sz="1600" dirty="0"/>
           </a:p>
           <a:p>
             <a:pPr marL="609600" indent="-609600">
               <a:buFontTx/>
               <a:buNone/>
             </a:pPr>
-            <a:endParaRPr lang="en-US" altLang="en-US" sz="1600"/>
+            <a:endParaRPr lang="en-US" altLang="en-US" sz="1600" dirty="0"/>
           </a:p>
         </p:txBody>
       </p:sp>
@@ -5415,7 +5423,7 @@
           <a:p>
             <a:pPr algn="ctr"/>
             <a:r>
-              <a:rPr lang="en-US" altLang="en-US" sz="2400" b="1">
+              <a:rPr lang="en-US" altLang="en-US" sz="2400" b="1" dirty="0">
                 <a:solidFill>
                   <a:schemeClr val="bg1"/>
                 </a:solidFill>
@@ -5427,7 +5435,7 @@
           <a:p>
             <a:pPr algn="ctr"/>
             <a:r>
-              <a:rPr lang="en-US" altLang="en-US" sz="2400" b="1">
+              <a:rPr lang="en-US" altLang="en-US" sz="2400" b="1" dirty="0">
                 <a:solidFill>
                   <a:schemeClr val="bg1"/>
                 </a:solidFill>
@@ -5435,7 +5443,7 @@
               </a:rPr>
               <a:t>CHECK YOUR ANSWER</a:t>
             </a:r>
-            <a:endParaRPr lang="en-US" altLang="en-US" sz="2400" b="1" i="1">
+            <a:endParaRPr lang="en-US" altLang="en-US" sz="2400" b="1" i="1" dirty="0">
               <a:solidFill>
                 <a:schemeClr val="bg1"/>
               </a:solidFill>
@@ -5490,7 +5498,7 @@
           <a:lstStyle/>
           <a:p>
             <a:r>
-              <a:rPr lang="en-US" altLang="en-US"/>
+              <a:rPr lang="en-US" altLang="en-US" dirty="0"/>
               <a:t>Electric Force and Charge</a:t>
             </a:r>
           </a:p>
@@ -5506,7 +5514,12 @@
             <p:ph type="body" idx="1"/>
           </p:nvPr>
         </p:nvSpPr>
-        <p:spPr/>
+        <p:spPr>
+          <a:xfrm>
+            <a:off x="487180" y="1348439"/>
+            <a:ext cx="8229600" cy="4530725"/>
+          </a:xfrm>
+        </p:spPr>
         <p:txBody>
           <a:bodyPr/>
           <a:lstStyle/>
@@ -5516,52 +5529,52 @@
               <a:buNone/>
             </a:pPr>
             <a:r>
-              <a:rPr lang="en-US" altLang="en-US"/>
+              <a:rPr lang="en-US" altLang="en-US" dirty="0"/>
               <a:t>Conservation of Charge</a:t>
             </a:r>
           </a:p>
           <a:p>
             <a:r>
-              <a:rPr lang="en-US" altLang="en-US" sz="2800"/>
+              <a:rPr lang="en-US" altLang="en-US" sz="2800" dirty="0"/>
               <a:t>In any charging process, </a:t>
             </a:r>
             <a:br>
-              <a:rPr lang="en-US" altLang="en-US" sz="2800"/>
+              <a:rPr lang="en-US" altLang="en-US" sz="2800" dirty="0"/>
             </a:br>
             <a:r>
-              <a:rPr lang="en-US" altLang="en-US" sz="2800"/>
+              <a:rPr lang="en-US" altLang="en-US" sz="2800" dirty="0"/>
               <a:t>no electrons are created </a:t>
             </a:r>
             <a:br>
-              <a:rPr lang="en-US" altLang="en-US" sz="2800"/>
+              <a:rPr lang="en-US" altLang="en-US" sz="2800" dirty="0"/>
             </a:br>
             <a:r>
-              <a:rPr lang="en-US" altLang="en-US" sz="2800"/>
+              <a:rPr lang="en-US" altLang="en-US" sz="2800" dirty="0"/>
               <a:t>or destroyed. Electrons </a:t>
             </a:r>
             <a:br>
-              <a:rPr lang="en-US" altLang="en-US" sz="2800"/>
+              <a:rPr lang="en-US" altLang="en-US" sz="2800" dirty="0"/>
             </a:br>
             <a:r>
-              <a:rPr lang="en-US" altLang="en-US" sz="2800"/>
+              <a:rPr lang="en-US" altLang="en-US" sz="2800" dirty="0"/>
               <a:t>are simply transferred from</a:t>
             </a:r>
             <a:br>
-              <a:rPr lang="en-US" altLang="en-US" sz="2800"/>
+              <a:rPr lang="en-US" altLang="en-US" sz="2800" dirty="0"/>
             </a:br>
             <a:r>
-              <a:rPr lang="en-US" altLang="en-US" sz="2800"/>
+              <a:rPr lang="en-US" altLang="en-US" sz="2800" dirty="0"/>
               <a:t>one material to another.</a:t>
             </a:r>
           </a:p>
           <a:p>
-            <a:endParaRPr lang="en-US" altLang="en-US"/>
-          </a:p>
-          <a:p>
-            <a:endParaRPr lang="en-US" altLang="en-US"/>
-          </a:p>
-          <a:p>
-            <a:endParaRPr lang="en-US" altLang="en-US"/>
+            <a:endParaRPr lang="en-US" altLang="en-US" dirty="0"/>
+          </a:p>
+          <a:p>
+            <a:endParaRPr lang="en-US" altLang="en-US" dirty="0"/>
+          </a:p>
+          <a:p>
+            <a:endParaRPr lang="en-US" altLang="en-US" dirty="0"/>
           </a:p>
         </p:txBody>
       </p:sp>
@@ -5588,7 +5601,7 @@
         </p:blipFill>
         <p:spPr bwMode="auto">
           <a:xfrm>
-            <a:off x="5486400" y="1828800"/>
+            <a:off x="5235575" y="1417638"/>
             <a:ext cx="3451225" cy="4645025"/>
           </a:xfrm>
           <a:prstGeom prst="rect">
@@ -5652,7 +5665,7 @@
           <a:lstStyle/>
           <a:p>
             <a:r>
-              <a:rPr lang="en-US" altLang="en-US"/>
+              <a:rPr lang="en-US" altLang="en-US" dirty="0"/>
               <a:t>Coulomb’s Law</a:t>
             </a:r>
           </a:p>
@@ -5670,7 +5683,7 @@
         </p:nvSpPr>
         <p:spPr>
           <a:xfrm>
-            <a:off x="457200" y="1295400"/>
+            <a:off x="457200" y="1219200"/>
             <a:ext cx="8229600" cy="4530725"/>
           </a:xfrm>
         </p:spPr>
@@ -5690,14 +5703,30 @@
           <a:p>
             <a:r>
               <a:rPr lang="en-US" altLang="en-US" sz="2800" dirty="0"/>
-              <a:t>relationship among electrical force, charge, and distance discovered by Charles Coulomb in the 18th century</a:t>
-            </a:r>
-          </a:p>
-          <a:p>
+              <a:t>relationship among electrical force, charge, and distance discovered by </a:t>
+            </a:r>
+            <a:r>
+              <a:rPr lang="en-US" altLang="en-US" sz="2800" b="1" dirty="0"/>
+              <a:t>Charles Coulomb </a:t>
+            </a:r>
             <a:r>
               <a:rPr lang="en-US" altLang="en-US" sz="2800" dirty="0"/>
-              <a:t>states that for a pair of charged objects that are much smaller than the distance between them, the force between them varies directly, as the product of their charges, and inversely, as the square of the separation distance</a:t>
-            </a:r>
+              <a:t>in the 18th century</a:t>
+            </a:r>
+          </a:p>
+          <a:p>
+            <a:r>
+              <a:rPr lang="en-US" altLang="en-US" sz="2800" dirty="0"/>
+              <a:t>states that for a pair of charged objects the force between them varies directly, as the product of their charges, and inversely, as the square of the separation distance</a:t>
+            </a:r>
+          </a:p>
+          <a:p>
+            <a:r>
+              <a:rPr lang="en-US" altLang="en-US" sz="2800" dirty="0"/>
+              <a:t>electrical forces may be either attractive or repulsive</a:t>
+            </a:r>
+          </a:p>
+          <a:p>
             <a:endParaRPr lang="en-US" altLang="en-US" dirty="0"/>
           </a:p>
         </p:txBody>
@@ -5748,7 +5777,7 @@
           <a:lstStyle/>
           <a:p>
             <a:r>
-              <a:rPr lang="en-US" altLang="en-US"/>
+              <a:rPr lang="en-US" altLang="en-US" dirty="0"/>
               <a:t>Coulomb’s Law</a:t>
             </a:r>
           </a:p>
@@ -5757,6 +5786,1477 @@
       <p:sp>
         <p:nvSpPr>
           <p:cNvPr id="38915" name="Rectangle 3"/>
+          <p:cNvSpPr>
+            <a:spLocks noGrp="1" noChangeArrowheads="1"/>
+          </p:cNvSpPr>
+          <p:nvPr>
+            <p:ph type="body" idx="1"/>
+          </p:nvPr>
+        </p:nvSpPr>
+        <p:spPr>
+          <a:xfrm>
+            <a:off x="533400" y="990599"/>
+            <a:ext cx="8229600" cy="4876800"/>
+          </a:xfrm>
+        </p:spPr>
+        <p:txBody>
+          <a:bodyPr/>
+          <a:lstStyle/>
+          <a:p>
+            <a:pPr>
+              <a:buFontTx/>
+              <a:buNone/>
+            </a:pPr>
+            <a:r>
+              <a:rPr lang="en-US" altLang="en-US" dirty="0"/>
+              <a:t>Coulomb’s law (continued)</a:t>
+            </a:r>
+          </a:p>
+          <a:p>
+            <a:r>
+              <a:rPr lang="en-US" altLang="en-US" sz="2800" dirty="0"/>
+              <a:t>If the charges are alike in sign, the force is repelling; if the charges are not alike, the force is attractive.</a:t>
+            </a:r>
+          </a:p>
+          <a:p>
+            <a:r>
+              <a:rPr lang="en-US" altLang="en-US" sz="2800" dirty="0"/>
+              <a:t>in equation form: 			</a:t>
+            </a:r>
+          </a:p>
+          <a:p>
+            <a:pPr>
+              <a:buFontTx/>
+              <a:buNone/>
+            </a:pPr>
+            <a:r>
+              <a:rPr lang="en-US" altLang="en-US" sz="2800" dirty="0"/>
+              <a:t>					k = 9,000,000,000 Nm</a:t>
+            </a:r>
+            <a:r>
+              <a:rPr lang="en-US" altLang="en-US" sz="2800" baseline="30000" dirty="0"/>
+              <a:t>2</a:t>
+            </a:r>
+            <a:r>
+              <a:rPr lang="en-US" altLang="en-US" sz="2800" dirty="0"/>
+              <a:t>/C</a:t>
+            </a:r>
+            <a:r>
+              <a:rPr lang="en-US" altLang="en-US" sz="2800" baseline="30000" dirty="0"/>
+              <a:t>2</a:t>
+            </a:r>
+          </a:p>
+          <a:p>
+            <a:endParaRPr lang="en-US" altLang="en-US" sz="2800" dirty="0"/>
+          </a:p>
+          <a:p>
+            <a:endParaRPr lang="en-US" altLang="en-US" sz="2800" dirty="0"/>
+          </a:p>
+          <a:p>
+            <a:r>
+              <a:rPr lang="en-US" altLang="en-US" sz="2800" dirty="0"/>
+              <a:t>unit of charge is coulomb, C</a:t>
+            </a:r>
+          </a:p>
+        </p:txBody>
+      </p:sp>
+      <p:pic>
+        <p:nvPicPr>
+          <p:cNvPr id="2" name="Picture 1"/>
+          <p:cNvPicPr>
+            <a:picLocks noChangeAspect="1"/>
+          </p:cNvPicPr>
+          <p:nvPr/>
+        </p:nvPicPr>
+        <p:blipFill>
+          <a:blip r:embed="rId2">
+            <a:extLst>
+              <a:ext uri="{28A0092B-C50C-407E-A947-70E740481C1C}">
+                <a14:useLocalDpi xmlns:a14="http://schemas.microsoft.com/office/drawing/2010/main" val="0"/>
+              </a:ext>
+            </a:extLst>
+          </a:blip>
+          <a:stretch>
+            <a:fillRect/>
+          </a:stretch>
+        </p:blipFill>
+        <p:spPr>
+          <a:xfrm>
+            <a:off x="685800" y="3428999"/>
+            <a:ext cx="3067050" cy="1495425"/>
+          </a:xfrm>
+          <a:prstGeom prst="rect">
+            <a:avLst/>
+          </a:prstGeom>
+        </p:spPr>
+      </p:pic>
+    </p:spTree>
+    <p:extLst>
+      <p:ext uri="{BB962C8B-B14F-4D97-AF65-F5344CB8AC3E}">
+        <p14:creationId xmlns:p14="http://schemas.microsoft.com/office/powerpoint/2010/main" val="171656914"/>
+      </p:ext>
+    </p:extLst>
+  </p:cSld>
+  <p:clrMapOvr>
+    <a:masterClrMapping/>
+  </p:clrMapOvr>
+</p:sld>
+</file>
+
+<file path=ppt/slides/slide16.xml><?xml version="1.0" encoding="utf-8"?>
+<p:sld xmlns:a="http://schemas.openxmlformats.org/drawingml/2006/main" xmlns:r="http://schemas.openxmlformats.org/officeDocument/2006/relationships" xmlns:p="http://schemas.openxmlformats.org/presentationml/2006/main">
+  <p:cSld>
+    <p:spTree>
+      <p:nvGrpSpPr>
+        <p:cNvPr id="1" name=""/>
+        <p:cNvGrpSpPr/>
+        <p:nvPr/>
+      </p:nvGrpSpPr>
+      <p:grpSpPr>
+        <a:xfrm>
+          <a:off x="0" y="0"/>
+          <a:ext cx="0" cy="0"/>
+          <a:chOff x="0" y="0"/>
+          <a:chExt cx="0" cy="0"/>
+        </a:xfrm>
+      </p:grpSpPr>
+      <p:sp>
+        <p:nvSpPr>
+          <p:cNvPr id="2" name="Title 1"/>
+          <p:cNvSpPr>
+            <a:spLocks noGrp="1"/>
+          </p:cNvSpPr>
+          <p:nvPr>
+            <p:ph type="title"/>
+          </p:nvPr>
+        </p:nvSpPr>
+        <p:spPr/>
+        <p:txBody>
+          <a:bodyPr/>
+          <a:lstStyle/>
+          <a:p>
+            <a:r>
+              <a:rPr lang="en-US" dirty="0"/>
+              <a:t>Coulomb’s Law</a:t>
+            </a:r>
+          </a:p>
+        </p:txBody>
+      </p:sp>
+      <p:pic>
+        <p:nvPicPr>
+          <p:cNvPr id="4" name="Content Placeholder 3"/>
+          <p:cNvPicPr>
+            <a:picLocks noGrp="1" noChangeAspect="1"/>
+          </p:cNvPicPr>
+          <p:nvPr>
+            <p:ph idx="1"/>
+          </p:nvPr>
+        </p:nvPicPr>
+        <p:blipFill>
+          <a:blip r:embed="rId2">
+            <a:extLst>
+              <a:ext uri="{28A0092B-C50C-407E-A947-70E740481C1C}">
+                <a14:useLocalDpi xmlns:a14="http://schemas.microsoft.com/office/drawing/2010/main" val="0"/>
+              </a:ext>
+            </a:extLst>
+          </a:blip>
+          <a:stretch>
+            <a:fillRect/>
+          </a:stretch>
+        </p:blipFill>
+        <p:spPr>
+          <a:xfrm>
+            <a:off x="1845988" y="1905000"/>
+            <a:ext cx="5452024" cy="2517775"/>
+          </a:xfrm>
+        </p:spPr>
+      </p:pic>
+    </p:spTree>
+    <p:extLst>
+      <p:ext uri="{BB962C8B-B14F-4D97-AF65-F5344CB8AC3E}">
+        <p14:creationId xmlns:p14="http://schemas.microsoft.com/office/powerpoint/2010/main" val="1913760733"/>
+      </p:ext>
+    </p:extLst>
+  </p:cSld>
+  <p:clrMapOvr>
+    <a:masterClrMapping/>
+  </p:clrMapOvr>
+</p:sld>
+</file>
+
+<file path=ppt/slides/slide17.xml><?xml version="1.0" encoding="utf-8"?>
+<p:sld xmlns:a="http://schemas.openxmlformats.org/drawingml/2006/main" xmlns:r="http://schemas.openxmlformats.org/officeDocument/2006/relationships" xmlns:p="http://schemas.openxmlformats.org/presentationml/2006/main">
+  <p:cSld>
+    <p:spTree>
+      <p:nvGrpSpPr>
+        <p:cNvPr id="1" name=""/>
+        <p:cNvGrpSpPr/>
+        <p:nvPr/>
+      </p:nvGrpSpPr>
+      <p:grpSpPr>
+        <a:xfrm>
+          <a:off x="0" y="0"/>
+          <a:ext cx="0" cy="0"/>
+          <a:chOff x="0" y="0"/>
+          <a:chExt cx="0" cy="0"/>
+        </a:xfrm>
+      </p:grpSpPr>
+      <p:sp>
+        <p:nvSpPr>
+          <p:cNvPr id="68610" name="Rectangle 1026"/>
+          <p:cNvSpPr>
+            <a:spLocks noGrp="1" noChangeArrowheads="1"/>
+          </p:cNvSpPr>
+          <p:nvPr>
+            <p:ph type="title"/>
+          </p:nvPr>
+        </p:nvSpPr>
+        <p:spPr>
+          <a:xfrm>
+            <a:off x="457200" y="990600"/>
+            <a:ext cx="8229600" cy="1752600"/>
+          </a:xfrm>
+        </p:spPr>
+        <p:txBody>
+          <a:bodyPr/>
+          <a:lstStyle/>
+          <a:p>
+            <a:pPr algn="l"/>
+            <a:r>
+              <a:rPr lang="en-US" altLang="en-US" sz="2400" dirty="0"/>
+              <a:t>According to Coulomb’s law, a pair of particles that are placed twice as far apart will experience forces that are</a:t>
+            </a:r>
+            <a:endParaRPr lang="en-US" altLang="en-US" sz="2800" b="1" i="1" dirty="0">
+              <a:latin typeface="Batang" pitchFamily="18" charset="-127"/>
+              <a:ea typeface="Batang" pitchFamily="18" charset="-127"/>
+            </a:endParaRPr>
+          </a:p>
+        </p:txBody>
+      </p:sp>
+      <p:sp>
+        <p:nvSpPr>
+          <p:cNvPr id="68611" name="Rectangle 1027"/>
+          <p:cNvSpPr>
+            <a:spLocks noGrp="1" noChangeArrowheads="1"/>
+          </p:cNvSpPr>
+          <p:nvPr>
+            <p:ph type="body" idx="1"/>
+          </p:nvPr>
+        </p:nvSpPr>
+        <p:spPr>
+          <a:xfrm>
+            <a:off x="457200" y="2895600"/>
+            <a:ext cx="8229600" cy="3962400"/>
+          </a:xfrm>
+        </p:spPr>
+        <p:txBody>
+          <a:bodyPr/>
+          <a:lstStyle/>
+          <a:p>
+            <a:pPr marL="609600" indent="-609600">
+              <a:buFontTx/>
+              <a:buNone/>
+            </a:pPr>
+            <a:r>
+              <a:rPr lang="en-US" altLang="en-US" sz="2000" dirty="0"/>
+              <a:t>A.	half as strong.</a:t>
+            </a:r>
+            <a:endParaRPr lang="en-US" altLang="en-US" sz="2000" dirty="0">
+              <a:ea typeface="Batang" pitchFamily="18" charset="-127"/>
+            </a:endParaRPr>
+          </a:p>
+          <a:p>
+            <a:pPr marL="609600" indent="-609600">
+              <a:buFontTx/>
+              <a:buAutoNum type="alphaUcPeriod" startAt="2"/>
+            </a:pPr>
+            <a:r>
+              <a:rPr lang="en-US" altLang="en-US" sz="2000" dirty="0"/>
+              <a:t>one-quarter as strong.</a:t>
+            </a:r>
+            <a:r>
+              <a:rPr lang="en-US" altLang="en-US" sz="2000" b="1" dirty="0">
+                <a:ea typeface="Batang" pitchFamily="18" charset="-127"/>
+              </a:rPr>
+              <a:t> </a:t>
+            </a:r>
+          </a:p>
+          <a:p>
+            <a:pPr marL="609600" indent="-609600">
+              <a:buFontTx/>
+              <a:buAutoNum type="alphaUcPeriod" startAt="2"/>
+            </a:pPr>
+            <a:r>
+              <a:rPr lang="en-US" altLang="en-US" sz="2000" dirty="0"/>
+              <a:t>twice as strong.</a:t>
+            </a:r>
+            <a:endParaRPr lang="en-US" altLang="en-US" sz="2000" dirty="0">
+              <a:ea typeface="Batang" pitchFamily="18" charset="-127"/>
+            </a:endParaRPr>
+          </a:p>
+          <a:p>
+            <a:pPr marL="609600" indent="-609600">
+              <a:buFontTx/>
+              <a:buAutoNum type="alphaUcPeriod" startAt="4"/>
+            </a:pPr>
+            <a:r>
+              <a:rPr lang="en-US" altLang="en-US" sz="2000" dirty="0"/>
+              <a:t>four times as strong.</a:t>
+            </a:r>
+          </a:p>
+          <a:p>
+            <a:pPr marL="609600" indent="-609600">
+              <a:buFontTx/>
+              <a:buNone/>
+            </a:pPr>
+            <a:endParaRPr lang="en-US" altLang="en-US" sz="2000" dirty="0"/>
+          </a:p>
+        </p:txBody>
+      </p:sp>
+      <p:sp>
+        <p:nvSpPr>
+          <p:cNvPr id="68612" name="Rectangle 1028"/>
+          <p:cNvSpPr>
+            <a:spLocks noChangeArrowheads="1"/>
+          </p:cNvSpPr>
+          <p:nvPr/>
+        </p:nvSpPr>
+        <p:spPr bwMode="auto">
+          <a:xfrm>
+            <a:off x="0" y="0"/>
+            <a:ext cx="9144000" cy="762000"/>
+          </a:xfrm>
+          <a:prstGeom prst="rect">
+            <a:avLst/>
+          </a:prstGeom>
+          <a:solidFill>
+            <a:srgbClr val="3B79AC"/>
+          </a:solidFill>
+          <a:ln>
+            <a:noFill/>
+          </a:ln>
+          <a:effectLst/>
+          <a:extLst>
+            <a:ext uri="{91240B29-F687-4F45-9708-019B960494DF}">
+              <a14:hiddenLine xmlns:a14="http://schemas.microsoft.com/office/drawing/2010/main" w="9525">
+                <a:solidFill>
+                  <a:schemeClr val="tx1"/>
+                </a:solidFill>
+                <a:miter lim="800000"/>
+                <a:headEnd/>
+                <a:tailEnd/>
+              </a14:hiddenLine>
+            </a:ext>
+            <a:ext uri="{AF507438-7753-43E0-B8FC-AC1667EBCBE1}">
+              <a14:hiddenEffects xmlns:a14="http://schemas.microsoft.com/office/drawing/2010/main">
+                <a:effectLst>
+                  <a:outerShdw dist="35921" dir="2700000" algn="ctr" rotWithShape="0">
+                    <a:schemeClr val="bg2"/>
+                  </a:outerShdw>
+                </a:effectLst>
+              </a14:hiddenEffects>
+            </a:ext>
+          </a:extLst>
+        </p:spPr>
+        <p:txBody>
+          <a:bodyPr wrap="none" anchor="ctr"/>
+          <a:lstStyle/>
+          <a:p>
+            <a:pPr algn="ctr"/>
+            <a:r>
+              <a:rPr lang="en-US" altLang="en-US" sz="2400" b="1" dirty="0">
+                <a:solidFill>
+                  <a:schemeClr val="bg1"/>
+                </a:solidFill>
+                <a:cs typeface="Arial" panose="020B0604020202020204" pitchFamily="34" charset="0"/>
+              </a:rPr>
+              <a:t>Coulomb’s Law</a:t>
+            </a:r>
+          </a:p>
+          <a:p>
+            <a:pPr algn="ctr"/>
+            <a:r>
+              <a:rPr lang="en-US" altLang="en-US" sz="2400" b="1" dirty="0">
+                <a:solidFill>
+                  <a:schemeClr val="bg1"/>
+                </a:solidFill>
+                <a:cs typeface="Arial" panose="020B0604020202020204" pitchFamily="34" charset="0"/>
+              </a:rPr>
+              <a:t>CHECK YOUR NEIGHBOR</a:t>
+            </a:r>
+            <a:r>
+              <a:rPr lang="en-US" altLang="en-US" sz="2400" b="1" i="1" dirty="0">
+                <a:solidFill>
+                  <a:schemeClr val="bg1"/>
+                </a:solidFill>
+                <a:cs typeface="Arial" panose="020B0604020202020204" pitchFamily="34" charset="0"/>
+              </a:rPr>
+              <a:t> </a:t>
+            </a:r>
+          </a:p>
+        </p:txBody>
+      </p:sp>
+    </p:spTree>
+    <p:extLst>
+      <p:ext uri="{BB962C8B-B14F-4D97-AF65-F5344CB8AC3E}">
+        <p14:creationId xmlns:p14="http://schemas.microsoft.com/office/powerpoint/2010/main" val="1698730843"/>
+      </p:ext>
+    </p:extLst>
+  </p:cSld>
+  <p:clrMapOvr>
+    <a:masterClrMapping/>
+  </p:clrMapOvr>
+</p:sld>
+</file>
+
+<file path=ppt/slides/slide18.xml><?xml version="1.0" encoding="utf-8"?>
+<p:sld xmlns:a="http://schemas.openxmlformats.org/drawingml/2006/main" xmlns:r="http://schemas.openxmlformats.org/officeDocument/2006/relationships" xmlns:p="http://schemas.openxmlformats.org/presentationml/2006/main">
+  <p:cSld>
+    <p:spTree>
+      <p:nvGrpSpPr>
+        <p:cNvPr id="1" name=""/>
+        <p:cNvGrpSpPr/>
+        <p:nvPr/>
+      </p:nvGrpSpPr>
+      <p:grpSpPr>
+        <a:xfrm>
+          <a:off x="0" y="0"/>
+          <a:ext cx="0" cy="0"/>
+          <a:chOff x="0" y="0"/>
+          <a:chExt cx="0" cy="0"/>
+        </a:xfrm>
+      </p:grpSpPr>
+      <p:sp>
+        <p:nvSpPr>
+          <p:cNvPr id="70658" name="Rectangle 1026"/>
+          <p:cNvSpPr>
+            <a:spLocks noGrp="1" noChangeArrowheads="1"/>
+          </p:cNvSpPr>
+          <p:nvPr>
+            <p:ph type="title"/>
+          </p:nvPr>
+        </p:nvSpPr>
+        <p:spPr>
+          <a:xfrm>
+            <a:off x="457200" y="990600"/>
+            <a:ext cx="8229600" cy="1752600"/>
+          </a:xfrm>
+        </p:spPr>
+        <p:txBody>
+          <a:bodyPr/>
+          <a:lstStyle/>
+          <a:p>
+            <a:pPr algn="l"/>
+            <a:r>
+              <a:rPr lang="en-US" altLang="en-US" sz="2400" dirty="0"/>
+              <a:t>According to Coulomb’s law, a pair of particles that are placed twice as far apart will experience forces that are</a:t>
+            </a:r>
+          </a:p>
+        </p:txBody>
+      </p:sp>
+      <p:sp>
+        <p:nvSpPr>
+          <p:cNvPr id="70659" name="Rectangle 1027"/>
+          <p:cNvSpPr>
+            <a:spLocks noGrp="1" noChangeArrowheads="1"/>
+          </p:cNvSpPr>
+          <p:nvPr>
+            <p:ph type="body" idx="1"/>
+          </p:nvPr>
+        </p:nvSpPr>
+        <p:spPr>
+          <a:xfrm>
+            <a:off x="457200" y="2895600"/>
+            <a:ext cx="8229600" cy="3962400"/>
+          </a:xfrm>
+        </p:spPr>
+        <p:txBody>
+          <a:bodyPr/>
+          <a:lstStyle/>
+          <a:p>
+            <a:pPr marL="609600" indent="-609600">
+              <a:buFontTx/>
+              <a:buNone/>
+            </a:pPr>
+            <a:r>
+              <a:rPr lang="en-US" altLang="en-US" sz="2000" dirty="0"/>
+              <a:t>A.	half as strong.</a:t>
+            </a:r>
+            <a:endParaRPr lang="en-US" altLang="en-US" sz="2000" dirty="0">
+              <a:ea typeface="Batang" pitchFamily="18" charset="-127"/>
+            </a:endParaRPr>
+          </a:p>
+          <a:p>
+            <a:pPr marL="609600" indent="-609600">
+              <a:buFontTx/>
+              <a:buAutoNum type="alphaUcPeriod" startAt="2"/>
+            </a:pPr>
+            <a:r>
+              <a:rPr lang="en-US" altLang="en-US" sz="2000" b="1" dirty="0"/>
+              <a:t>one-quarter as strong.</a:t>
+            </a:r>
+            <a:r>
+              <a:rPr lang="en-US" altLang="en-US" sz="2000" b="1" dirty="0">
+                <a:ea typeface="Batang" pitchFamily="18" charset="-127"/>
+              </a:rPr>
+              <a:t> </a:t>
+            </a:r>
+          </a:p>
+          <a:p>
+            <a:pPr marL="609600" indent="-609600">
+              <a:buFontTx/>
+              <a:buAutoNum type="alphaUcPeriod" startAt="2"/>
+            </a:pPr>
+            <a:r>
+              <a:rPr lang="en-US" altLang="en-US" sz="2000" dirty="0"/>
+              <a:t>twice as strong.</a:t>
+            </a:r>
+            <a:endParaRPr lang="en-US" altLang="en-US" sz="2000" dirty="0">
+              <a:ea typeface="Batang" pitchFamily="18" charset="-127"/>
+            </a:endParaRPr>
+          </a:p>
+          <a:p>
+            <a:pPr marL="609600" indent="-609600">
+              <a:buFontTx/>
+              <a:buAutoNum type="alphaUcPeriod" startAt="4"/>
+            </a:pPr>
+            <a:r>
+              <a:rPr lang="en-US" altLang="en-US" sz="2000" dirty="0"/>
+              <a:t>four times as strong.</a:t>
+            </a:r>
+          </a:p>
+          <a:p>
+            <a:pPr marL="609600" indent="-609600">
+              <a:buFontTx/>
+              <a:buNone/>
+            </a:pPr>
+            <a:endParaRPr lang="en-US" altLang="en-US" sz="2000" dirty="0"/>
+          </a:p>
+        </p:txBody>
+      </p:sp>
+      <p:sp>
+        <p:nvSpPr>
+          <p:cNvPr id="70660" name="Rectangle 1028"/>
+          <p:cNvSpPr>
+            <a:spLocks noChangeArrowheads="1"/>
+          </p:cNvSpPr>
+          <p:nvPr/>
+        </p:nvSpPr>
+        <p:spPr bwMode="auto">
+          <a:xfrm>
+            <a:off x="0" y="0"/>
+            <a:ext cx="9144000" cy="762000"/>
+          </a:xfrm>
+          <a:prstGeom prst="rect">
+            <a:avLst/>
+          </a:prstGeom>
+          <a:solidFill>
+            <a:srgbClr val="3B79AC"/>
+          </a:solidFill>
+          <a:ln>
+            <a:noFill/>
+          </a:ln>
+          <a:effectLst/>
+          <a:extLst>
+            <a:ext uri="{91240B29-F687-4F45-9708-019B960494DF}">
+              <a14:hiddenLine xmlns:a14="http://schemas.microsoft.com/office/drawing/2010/main" w="9525">
+                <a:solidFill>
+                  <a:schemeClr val="tx1"/>
+                </a:solidFill>
+                <a:miter lim="800000"/>
+                <a:headEnd/>
+                <a:tailEnd/>
+              </a14:hiddenLine>
+            </a:ext>
+            <a:ext uri="{AF507438-7753-43E0-B8FC-AC1667EBCBE1}">
+              <a14:hiddenEffects xmlns:a14="http://schemas.microsoft.com/office/drawing/2010/main">
+                <a:effectLst>
+                  <a:outerShdw dist="35921" dir="2700000" algn="ctr" rotWithShape="0">
+                    <a:schemeClr val="bg2"/>
+                  </a:outerShdw>
+                </a:effectLst>
+              </a14:hiddenEffects>
+            </a:ext>
+          </a:extLst>
+        </p:spPr>
+        <p:txBody>
+          <a:bodyPr wrap="none" anchor="ctr"/>
+          <a:lstStyle/>
+          <a:p>
+            <a:pPr algn="ctr"/>
+            <a:r>
+              <a:rPr lang="en-US" altLang="en-US" sz="2400" b="1" dirty="0">
+                <a:solidFill>
+                  <a:schemeClr val="bg1"/>
+                </a:solidFill>
+                <a:cs typeface="Arial" panose="020B0604020202020204" pitchFamily="34" charset="0"/>
+              </a:rPr>
+              <a:t>Coulomb’s Law</a:t>
+            </a:r>
+          </a:p>
+          <a:p>
+            <a:pPr algn="ctr"/>
+            <a:r>
+              <a:rPr lang="en-US" altLang="en-US" sz="2400" b="1" dirty="0">
+                <a:solidFill>
+                  <a:schemeClr val="bg1"/>
+                </a:solidFill>
+                <a:cs typeface="Arial" panose="020B0604020202020204" pitchFamily="34" charset="0"/>
+              </a:rPr>
+              <a:t>CHECK YOUR ANSWER</a:t>
+            </a:r>
+            <a:endParaRPr lang="en-US" altLang="en-US" sz="2400" b="1" i="1" dirty="0">
+              <a:solidFill>
+                <a:schemeClr val="bg1"/>
+              </a:solidFill>
+              <a:cs typeface="Arial" panose="020B0604020202020204" pitchFamily="34" charset="0"/>
+            </a:endParaRPr>
+          </a:p>
+        </p:txBody>
+      </p:sp>
+    </p:spTree>
+    <p:extLst>
+      <p:ext uri="{BB962C8B-B14F-4D97-AF65-F5344CB8AC3E}">
+        <p14:creationId xmlns:p14="http://schemas.microsoft.com/office/powerpoint/2010/main" val="2792510912"/>
+      </p:ext>
+    </p:extLst>
+  </p:cSld>
+  <p:clrMapOvr>
+    <a:masterClrMapping/>
+  </p:clrMapOvr>
+</p:sld>
+</file>
+
+<file path=ppt/slides/slide19.xml><?xml version="1.0" encoding="utf-8"?>
+<p:sld xmlns:a="http://schemas.openxmlformats.org/drawingml/2006/main" xmlns:r="http://schemas.openxmlformats.org/officeDocument/2006/relationships" xmlns:p="http://schemas.openxmlformats.org/presentationml/2006/main">
+  <p:cSld>
+    <p:spTree>
+      <p:nvGrpSpPr>
+        <p:cNvPr id="1" name=""/>
+        <p:cNvGrpSpPr/>
+        <p:nvPr/>
+      </p:nvGrpSpPr>
+      <p:grpSpPr>
+        <a:xfrm>
+          <a:off x="0" y="0"/>
+          <a:ext cx="0" cy="0"/>
+          <a:chOff x="0" y="0"/>
+          <a:chExt cx="0" cy="0"/>
+        </a:xfrm>
+      </p:grpSpPr>
+      <p:sp>
+        <p:nvSpPr>
+          <p:cNvPr id="12290" name="Rectangle 2"/>
+          <p:cNvSpPr>
+            <a:spLocks noGrp="1" noChangeArrowheads="1"/>
+          </p:cNvSpPr>
+          <p:nvPr>
+            <p:ph type="title"/>
+          </p:nvPr>
+        </p:nvSpPr>
+        <p:spPr/>
+        <p:txBody>
+          <a:bodyPr/>
+          <a:lstStyle/>
+          <a:p>
+            <a:r>
+              <a:rPr lang="en-US" altLang="en-US" dirty="0"/>
+              <a:t>Electric Field</a:t>
+            </a:r>
+          </a:p>
+        </p:txBody>
+      </p:sp>
+      <p:sp>
+        <p:nvSpPr>
+          <p:cNvPr id="12291" name="Rectangle 3"/>
+          <p:cNvSpPr>
+            <a:spLocks noGrp="1" noChangeArrowheads="1"/>
+          </p:cNvSpPr>
+          <p:nvPr>
+            <p:ph type="body" idx="1"/>
+          </p:nvPr>
+        </p:nvSpPr>
+        <p:spPr>
+          <a:xfrm>
+            <a:off x="487907" y="1143000"/>
+            <a:ext cx="8458200" cy="4530725"/>
+          </a:xfrm>
+        </p:spPr>
+        <p:txBody>
+          <a:bodyPr/>
+          <a:lstStyle/>
+          <a:p>
+            <a:pPr>
+              <a:lnSpc>
+                <a:spcPct val="90000"/>
+              </a:lnSpc>
+              <a:buFontTx/>
+              <a:buNone/>
+            </a:pPr>
+            <a:r>
+              <a:rPr lang="en-US" altLang="en-US" dirty="0"/>
+              <a:t>Electric field</a:t>
+            </a:r>
+          </a:p>
+          <a:p>
+            <a:pPr>
+              <a:lnSpc>
+                <a:spcPct val="90000"/>
+              </a:lnSpc>
+            </a:pPr>
+            <a:r>
+              <a:rPr lang="en-US" altLang="en-US" sz="2800" dirty="0"/>
+              <a:t>Charge exhibits an electric field </a:t>
+            </a:r>
+          </a:p>
+          <a:p>
+            <a:pPr>
+              <a:lnSpc>
+                <a:spcPct val="90000"/>
+              </a:lnSpc>
+            </a:pPr>
+            <a:r>
+              <a:rPr lang="en-US" altLang="en-US" sz="2800" dirty="0"/>
+              <a:t>space surrounding an electric charge (an energetic aura)</a:t>
+            </a:r>
+          </a:p>
+          <a:p>
+            <a:pPr>
+              <a:lnSpc>
+                <a:spcPct val="90000"/>
+              </a:lnSpc>
+            </a:pPr>
+            <a:r>
+              <a:rPr lang="en-US" altLang="en-US" sz="2800" dirty="0"/>
+              <a:t>describes electric force</a:t>
+            </a:r>
+          </a:p>
+          <a:p>
+            <a:pPr>
+              <a:lnSpc>
+                <a:spcPct val="90000"/>
+              </a:lnSpc>
+            </a:pPr>
+            <a:r>
+              <a:rPr lang="en-US" altLang="en-US" sz="2800" dirty="0"/>
+              <a:t>around a charged particle obeys inverse-square law</a:t>
+            </a:r>
+          </a:p>
+          <a:p>
+            <a:pPr>
+              <a:lnSpc>
+                <a:spcPct val="90000"/>
+              </a:lnSpc>
+            </a:pPr>
+            <a:r>
+              <a:rPr lang="en-US" altLang="en-US" sz="2800" dirty="0"/>
+              <a:t>force per unit charge</a:t>
+            </a:r>
+          </a:p>
+          <a:p>
+            <a:pPr>
+              <a:lnSpc>
+                <a:spcPct val="90000"/>
+              </a:lnSpc>
+              <a:buFontTx/>
+              <a:buNone/>
+            </a:pPr>
+            <a:endParaRPr lang="en-US" altLang="en-US" sz="1800" dirty="0"/>
+          </a:p>
+          <a:p>
+            <a:pPr>
+              <a:lnSpc>
+                <a:spcPct val="90000"/>
+              </a:lnSpc>
+              <a:buFontTx/>
+              <a:buNone/>
+            </a:pPr>
+            <a:endParaRPr lang="en-US" altLang="en-US" sz="1800" dirty="0"/>
+          </a:p>
+          <a:p>
+            <a:pPr>
+              <a:lnSpc>
+                <a:spcPct val="90000"/>
+              </a:lnSpc>
+              <a:buFontTx/>
+              <a:buNone/>
+            </a:pPr>
+            <a:br>
+              <a:rPr lang="en-US" altLang="en-US" sz="1800" dirty="0"/>
+            </a:br>
+            <a:endParaRPr lang="en-US" altLang="en-US" sz="2800" dirty="0"/>
+          </a:p>
+        </p:txBody>
+      </p:sp>
+      <p:pic>
+        <p:nvPicPr>
+          <p:cNvPr id="6" name="Picture 4" descr="10_09FigureA-F"/>
+          <p:cNvPicPr>
+            <a:picLocks noChangeAspect="1" noChangeArrowheads="1"/>
+          </p:cNvPicPr>
+          <p:nvPr/>
+        </p:nvPicPr>
+        <p:blipFill>
+          <a:blip r:embed="rId2" cstate="print">
+            <a:extLst>
+              <a:ext uri="{28A0092B-C50C-407E-A947-70E740481C1C}">
+                <a14:useLocalDpi xmlns:a14="http://schemas.microsoft.com/office/drawing/2010/main" val="0"/>
+              </a:ext>
+            </a:extLst>
+          </a:blip>
+          <a:srcRect b="20453"/>
+          <a:stretch>
+            <a:fillRect/>
+          </a:stretch>
+        </p:blipFill>
+        <p:spPr bwMode="auto">
+          <a:xfrm>
+            <a:off x="4876800" y="3962400"/>
+            <a:ext cx="2318544" cy="2336800"/>
+          </a:xfrm>
+          <a:prstGeom prst="rect">
+            <a:avLst/>
+          </a:prstGeom>
+          <a:noFill/>
+          <a:extLst>
+            <a:ext uri="{909E8E84-426E-40DD-AFC4-6F175D3DCCD1}">
+              <a14:hiddenFill xmlns:a14="http://schemas.microsoft.com/office/drawing/2010/main">
+                <a:solidFill>
+                  <a:srgbClr val="FFFFFF"/>
+                </a:solidFill>
+              </a14:hiddenFill>
+            </a:ext>
+          </a:extLst>
+        </p:spPr>
+      </p:pic>
+    </p:spTree>
+    <p:extLst>
+      <p:ext uri="{BB962C8B-B14F-4D97-AF65-F5344CB8AC3E}">
+        <p14:creationId xmlns:p14="http://schemas.microsoft.com/office/powerpoint/2010/main" val="4217775967"/>
+      </p:ext>
+    </p:extLst>
+  </p:cSld>
+  <p:clrMapOvr>
+    <a:masterClrMapping/>
+  </p:clrMapOvr>
+</p:sld>
+</file>
+
+<file path=ppt/slides/slide2.xml><?xml version="1.0" encoding="utf-8"?>
+<p:sld xmlns:a="http://schemas.openxmlformats.org/drawingml/2006/main" xmlns:r="http://schemas.openxmlformats.org/officeDocument/2006/relationships" xmlns:p="http://schemas.openxmlformats.org/presentationml/2006/main">
+  <p:cSld>
+    <p:spTree>
+      <p:nvGrpSpPr>
+        <p:cNvPr id="1" name=""/>
+        <p:cNvGrpSpPr/>
+        <p:nvPr/>
+      </p:nvGrpSpPr>
+      <p:grpSpPr>
+        <a:xfrm>
+          <a:off x="0" y="0"/>
+          <a:ext cx="0" cy="0"/>
+          <a:chOff x="0" y="0"/>
+          <a:chExt cx="0" cy="0"/>
+        </a:xfrm>
+      </p:grpSpPr>
+      <p:sp>
+        <p:nvSpPr>
+          <p:cNvPr id="2" name="Title 1"/>
+          <p:cNvSpPr>
+            <a:spLocks noGrp="1"/>
+          </p:cNvSpPr>
+          <p:nvPr>
+            <p:ph type="title"/>
+          </p:nvPr>
+        </p:nvSpPr>
+        <p:spPr>
+          <a:xfrm>
+            <a:off x="381000" y="152400"/>
+            <a:ext cx="8229600" cy="1139825"/>
+          </a:xfrm>
+        </p:spPr>
+        <p:txBody>
+          <a:bodyPr/>
+          <a:lstStyle/>
+          <a:p>
+            <a:r>
+              <a:rPr lang="en-US" dirty="0"/>
+              <a:t>Agenda </a:t>
+            </a:r>
+          </a:p>
+        </p:txBody>
+      </p:sp>
+      <p:sp>
+        <p:nvSpPr>
+          <p:cNvPr id="3" name="Content Placeholder 2"/>
+          <p:cNvSpPr>
+            <a:spLocks noGrp="1"/>
+          </p:cNvSpPr>
+          <p:nvPr>
+            <p:ph idx="1"/>
+          </p:nvPr>
+        </p:nvSpPr>
+        <p:spPr>
+          <a:xfrm>
+            <a:off x="381000" y="1143000"/>
+            <a:ext cx="8229600" cy="4530725"/>
+          </a:xfrm>
+        </p:spPr>
+        <p:txBody>
+          <a:bodyPr/>
+          <a:lstStyle/>
+          <a:p>
+            <a:r>
+              <a:rPr lang="en-US" dirty="0"/>
+              <a:t>Electric Charge</a:t>
+            </a:r>
+          </a:p>
+          <a:p>
+            <a:r>
+              <a:rPr lang="en-US" dirty="0"/>
+              <a:t>Coulombs Law</a:t>
+            </a:r>
+          </a:p>
+          <a:p>
+            <a:r>
+              <a:rPr lang="en-US" dirty="0"/>
+              <a:t>The Electric Field </a:t>
+            </a:r>
+          </a:p>
+          <a:p>
+            <a:r>
+              <a:rPr lang="en-US" dirty="0"/>
+              <a:t>Ohm’s Law</a:t>
+            </a:r>
+          </a:p>
+          <a:p>
+            <a:r>
+              <a:rPr lang="en-US" dirty="0"/>
+              <a:t>Lab: Electricity</a:t>
+            </a:r>
+          </a:p>
+          <a:p>
+            <a:pPr lvl="1"/>
+            <a:r>
+              <a:rPr lang="en-US" dirty="0">
+                <a:hlinkClick r:id="rId2"/>
+              </a:rPr>
+              <a:t>http://phet.colorado.edu/sims/charges-and-fields/charges-and-fields_en.html</a:t>
+            </a:r>
+            <a:endParaRPr lang="en-US" dirty="0"/>
+          </a:p>
+          <a:p>
+            <a:pPr lvl="1"/>
+            <a:endParaRPr lang="en-US" dirty="0"/>
+          </a:p>
+          <a:p>
+            <a:endParaRPr lang="en-US" dirty="0"/>
+          </a:p>
+          <a:p>
+            <a:endParaRPr lang="en-US" dirty="0"/>
+          </a:p>
+          <a:p>
+            <a:pPr>
+              <a:buNone/>
+            </a:pPr>
+            <a:endParaRPr lang="en-US" dirty="0"/>
+          </a:p>
+          <a:p>
+            <a:endParaRPr lang="en-US" dirty="0"/>
+          </a:p>
+          <a:p>
+            <a:pPr>
+              <a:buNone/>
+            </a:pPr>
+            <a:endParaRPr lang="en-US" dirty="0"/>
+          </a:p>
+          <a:p>
+            <a:endParaRPr lang="en-US" dirty="0"/>
+          </a:p>
+        </p:txBody>
+      </p:sp>
+      <p:pic>
+        <p:nvPicPr>
+          <p:cNvPr id="4" name="Picture 3"/>
+          <p:cNvPicPr>
+            <a:picLocks noChangeAspect="1"/>
+          </p:cNvPicPr>
+          <p:nvPr/>
+        </p:nvPicPr>
+        <p:blipFill>
+          <a:blip r:embed="rId3">
+            <a:extLst>
+              <a:ext uri="{28A0092B-C50C-407E-A947-70E740481C1C}">
+                <a14:useLocalDpi xmlns:a14="http://schemas.microsoft.com/office/drawing/2010/main" val="0"/>
+              </a:ext>
+            </a:extLst>
+          </a:blip>
+          <a:stretch>
+            <a:fillRect/>
+          </a:stretch>
+        </p:blipFill>
+        <p:spPr>
+          <a:xfrm>
+            <a:off x="5562600" y="841655"/>
+            <a:ext cx="2562225" cy="2562225"/>
+          </a:xfrm>
+          <a:prstGeom prst="rect">
+            <a:avLst/>
+          </a:prstGeom>
+        </p:spPr>
+      </p:pic>
+    </p:spTree>
+  </p:cSld>
+  <p:clrMapOvr>
+    <a:masterClrMapping/>
+  </p:clrMapOvr>
+</p:sld>
+</file>
+
+<file path=ppt/slides/slide20.xml><?xml version="1.0" encoding="utf-8"?>
+<p:sld xmlns:a="http://schemas.openxmlformats.org/drawingml/2006/main" xmlns:r="http://schemas.openxmlformats.org/officeDocument/2006/relationships" xmlns:p="http://schemas.openxmlformats.org/presentationml/2006/main">
+  <p:cSld>
+    <p:spTree>
+      <p:nvGrpSpPr>
+        <p:cNvPr id="1" name=""/>
+        <p:cNvGrpSpPr/>
+        <p:nvPr/>
+      </p:nvGrpSpPr>
+      <p:grpSpPr>
+        <a:xfrm>
+          <a:off x="0" y="0"/>
+          <a:ext cx="0" cy="0"/>
+          <a:chOff x="0" y="0"/>
+          <a:chExt cx="0" cy="0"/>
+        </a:xfrm>
+      </p:grpSpPr>
+      <p:sp>
+        <p:nvSpPr>
+          <p:cNvPr id="45058" name="Rectangle 2"/>
+          <p:cNvSpPr>
+            <a:spLocks noGrp="1" noChangeArrowheads="1"/>
+          </p:cNvSpPr>
+          <p:nvPr>
+            <p:ph type="title"/>
+          </p:nvPr>
+        </p:nvSpPr>
+        <p:spPr>
+          <a:xfrm>
+            <a:off x="457200" y="228600"/>
+            <a:ext cx="8229600" cy="1143000"/>
+          </a:xfrm>
+        </p:spPr>
+        <p:txBody>
+          <a:bodyPr/>
+          <a:lstStyle/>
+          <a:p>
+            <a:r>
+              <a:rPr lang="en-US" altLang="en-US" dirty="0"/>
+              <a:t>Electric Potential</a:t>
+            </a:r>
+          </a:p>
+        </p:txBody>
+      </p:sp>
+      <p:sp>
+        <p:nvSpPr>
+          <p:cNvPr id="45059" name="Rectangle 3"/>
+          <p:cNvSpPr>
+            <a:spLocks noGrp="1" noChangeArrowheads="1"/>
+          </p:cNvSpPr>
+          <p:nvPr>
+            <p:ph type="body" idx="1"/>
+          </p:nvPr>
+        </p:nvSpPr>
+        <p:spPr>
+          <a:xfrm>
+            <a:off x="457200" y="1219200"/>
+            <a:ext cx="8229600" cy="5029200"/>
+          </a:xfrm>
+        </p:spPr>
+        <p:txBody>
+          <a:bodyPr/>
+          <a:lstStyle/>
+          <a:p>
+            <a:pPr>
+              <a:lnSpc>
+                <a:spcPct val="90000"/>
+              </a:lnSpc>
+              <a:buFontTx/>
+              <a:buNone/>
+            </a:pPr>
+            <a:r>
+              <a:rPr lang="en-US" altLang="en-US" dirty="0"/>
+              <a:t>Electric potential difference</a:t>
+            </a:r>
+          </a:p>
+          <a:p>
+            <a:pPr>
+              <a:lnSpc>
+                <a:spcPct val="90000"/>
+              </a:lnSpc>
+            </a:pPr>
+            <a:r>
+              <a:rPr lang="en-US" altLang="en-US" sz="2800" dirty="0"/>
+              <a:t>Energy possessed by a charged particle due to  its location in an electric field. </a:t>
+            </a:r>
+          </a:p>
+          <a:p>
+            <a:pPr>
+              <a:lnSpc>
+                <a:spcPct val="90000"/>
+              </a:lnSpc>
+            </a:pPr>
+            <a:r>
+              <a:rPr lang="en-US" altLang="en-US" sz="2800" dirty="0"/>
+              <a:t>Charge flows from higher potential to lower potential </a:t>
+            </a:r>
+          </a:p>
+          <a:p>
+            <a:pPr>
+              <a:lnSpc>
+                <a:spcPct val="90000"/>
+              </a:lnSpc>
+            </a:pPr>
+            <a:r>
+              <a:rPr lang="en-US" altLang="en-US" sz="2800" dirty="0"/>
+              <a:t>A difference in potential between two points</a:t>
+            </a:r>
+          </a:p>
+          <a:p>
+            <a:pPr lvl="1">
+              <a:lnSpc>
+                <a:spcPct val="90000"/>
+              </a:lnSpc>
+            </a:pPr>
+            <a:r>
+              <a:rPr lang="en-US" altLang="en-US" dirty="0"/>
+              <a:t>charges in conductor flow from higher potential to lower potential</a:t>
+            </a:r>
+          </a:p>
+          <a:p>
+            <a:pPr lvl="1">
+              <a:lnSpc>
+                <a:spcPct val="90000"/>
+              </a:lnSpc>
+            </a:pPr>
+            <a:r>
+              <a:rPr lang="en-US" altLang="en-US" dirty="0"/>
+              <a:t>maintained for continuous flow by pumping device</a:t>
+            </a:r>
+          </a:p>
+          <a:p>
+            <a:pPr lvl="2">
+              <a:lnSpc>
+                <a:spcPct val="90000"/>
+              </a:lnSpc>
+            </a:pPr>
+            <a:r>
+              <a:rPr lang="en-US" altLang="en-US" sz="2000" dirty="0"/>
+              <a:t>A battery or generator can maintain a steady flow of charge</a:t>
+            </a:r>
+          </a:p>
+          <a:p>
+            <a:pPr lvl="2">
+              <a:lnSpc>
+                <a:spcPct val="90000"/>
+              </a:lnSpc>
+            </a:pPr>
+            <a:endParaRPr lang="en-US" altLang="en-US" dirty="0"/>
+          </a:p>
+          <a:p>
+            <a:pPr>
+              <a:lnSpc>
+                <a:spcPct val="90000"/>
+              </a:lnSpc>
+              <a:buFontTx/>
+              <a:buNone/>
+            </a:pPr>
+            <a:r>
+              <a:rPr lang="en-US" altLang="en-US" sz="3600" dirty="0"/>
+              <a:t>	</a:t>
+            </a:r>
+          </a:p>
+        </p:txBody>
+      </p:sp>
+    </p:spTree>
+    <p:extLst>
+      <p:ext uri="{BB962C8B-B14F-4D97-AF65-F5344CB8AC3E}">
+        <p14:creationId xmlns:p14="http://schemas.microsoft.com/office/powerpoint/2010/main" val="1608335093"/>
+      </p:ext>
+    </p:extLst>
+  </p:cSld>
+  <p:clrMapOvr>
+    <a:masterClrMapping/>
+  </p:clrMapOvr>
+</p:sld>
+</file>
+
+<file path=ppt/slides/slide21.xml><?xml version="1.0" encoding="utf-8"?>
+<p:sld xmlns:a="http://schemas.openxmlformats.org/drawingml/2006/main" xmlns:r="http://schemas.openxmlformats.org/officeDocument/2006/relationships" xmlns:p="http://schemas.openxmlformats.org/presentationml/2006/main">
+  <p:cSld>
+    <p:spTree>
+      <p:nvGrpSpPr>
+        <p:cNvPr id="1" name=""/>
+        <p:cNvGrpSpPr/>
+        <p:nvPr/>
+      </p:nvGrpSpPr>
+      <p:grpSpPr>
+        <a:xfrm>
+          <a:off x="0" y="0"/>
+          <a:ext cx="0" cy="0"/>
+          <a:chOff x="0" y="0"/>
+          <a:chExt cx="0" cy="0"/>
+        </a:xfrm>
+      </p:grpSpPr>
+      <p:sp>
+        <p:nvSpPr>
+          <p:cNvPr id="48130" name="Rectangle 2"/>
+          <p:cNvSpPr>
+            <a:spLocks noGrp="1" noChangeArrowheads="1"/>
+          </p:cNvSpPr>
+          <p:nvPr>
+            <p:ph type="title"/>
+          </p:nvPr>
+        </p:nvSpPr>
+        <p:spPr/>
+        <p:txBody>
+          <a:bodyPr/>
+          <a:lstStyle/>
+          <a:p>
+            <a:r>
+              <a:rPr lang="en-US" altLang="en-US" dirty="0"/>
+              <a:t>Electric Current</a:t>
+            </a:r>
+          </a:p>
+        </p:txBody>
+      </p:sp>
+      <p:sp>
+        <p:nvSpPr>
+          <p:cNvPr id="48131" name="Rectangle 3"/>
+          <p:cNvSpPr>
+            <a:spLocks noGrp="1" noChangeArrowheads="1"/>
+          </p:cNvSpPr>
+          <p:nvPr>
+            <p:ph type="body" idx="1"/>
+          </p:nvPr>
+        </p:nvSpPr>
+        <p:spPr>
+          <a:xfrm>
+            <a:off x="457200" y="1219200"/>
+            <a:ext cx="8229600" cy="4530725"/>
+          </a:xfrm>
+        </p:spPr>
+        <p:txBody>
+          <a:bodyPr/>
+          <a:lstStyle/>
+          <a:p>
+            <a:pPr>
+              <a:buFontTx/>
+              <a:buNone/>
+            </a:pPr>
+            <a:r>
+              <a:rPr lang="en-US" altLang="en-US" dirty="0"/>
+              <a:t>Rate of electric flow</a:t>
+            </a:r>
+          </a:p>
+          <a:p>
+            <a:r>
+              <a:rPr lang="en-US" altLang="en-US" sz="2800" dirty="0"/>
+              <a:t>measured in ampere (1 coulomb of charge per second)</a:t>
+            </a:r>
+          </a:p>
+          <a:p>
+            <a:r>
+              <a:rPr lang="en-US" altLang="en-US" sz="2800" dirty="0"/>
+              <a:t>charge flows </a:t>
+            </a:r>
+            <a:r>
+              <a:rPr lang="en-US" altLang="en-US" sz="2800" i="1" dirty="0"/>
+              <a:t>through</a:t>
+            </a:r>
+            <a:r>
+              <a:rPr lang="en-US" altLang="en-US" sz="2800" dirty="0"/>
+              <a:t> a circuit; voltage is established </a:t>
+            </a:r>
+            <a:r>
+              <a:rPr lang="en-US" altLang="en-US" sz="2800" i="1" dirty="0"/>
+              <a:t>across </a:t>
+            </a:r>
+            <a:r>
+              <a:rPr lang="en-US" altLang="en-US" sz="2800" dirty="0"/>
+              <a:t>a circuit</a:t>
+            </a:r>
+          </a:p>
+          <a:p>
+            <a:r>
+              <a:rPr lang="en-US" altLang="en-US" sz="2800" dirty="0"/>
+              <a:t>Relationship of current flow to material resistance and voltage (electrical potential)</a:t>
+            </a:r>
+          </a:p>
+          <a:p>
+            <a:pPr lvl="1"/>
+            <a:r>
+              <a:rPr lang="en-US" altLang="en-US" i="1" dirty="0"/>
+              <a:t>OHMS LAW</a:t>
+            </a:r>
+          </a:p>
+          <a:p>
+            <a:pPr lvl="2"/>
+            <a:r>
+              <a:rPr lang="en-US" altLang="en-US" i="1" dirty="0"/>
+              <a:t>V = IR</a:t>
+            </a:r>
+          </a:p>
+        </p:txBody>
+      </p:sp>
+    </p:spTree>
+    <p:extLst>
+      <p:ext uri="{BB962C8B-B14F-4D97-AF65-F5344CB8AC3E}">
+        <p14:creationId xmlns:p14="http://schemas.microsoft.com/office/powerpoint/2010/main" val="2218765855"/>
+      </p:ext>
+    </p:extLst>
+  </p:cSld>
+  <p:clrMapOvr>
+    <a:masterClrMapping/>
+  </p:clrMapOvr>
+</p:sld>
+</file>
+
+<file path=ppt/slides/slide22.xml><?xml version="1.0" encoding="utf-8"?>
+<p:sld xmlns:a="http://schemas.openxmlformats.org/drawingml/2006/main" xmlns:r="http://schemas.openxmlformats.org/officeDocument/2006/relationships" xmlns:p="http://schemas.openxmlformats.org/presentationml/2006/main">
+  <p:cSld>
+    <p:spTree>
+      <p:nvGrpSpPr>
+        <p:cNvPr id="1" name=""/>
+        <p:cNvGrpSpPr/>
+        <p:nvPr/>
+      </p:nvGrpSpPr>
+      <p:grpSpPr>
+        <a:xfrm>
+          <a:off x="0" y="0"/>
+          <a:ext cx="0" cy="0"/>
+          <a:chOff x="0" y="0"/>
+          <a:chExt cx="0" cy="0"/>
+        </a:xfrm>
+      </p:grpSpPr>
+      <p:sp>
+        <p:nvSpPr>
+          <p:cNvPr id="22530" name="Rectangle 2"/>
+          <p:cNvSpPr>
+            <a:spLocks noGrp="1" noChangeArrowheads="1"/>
+          </p:cNvSpPr>
+          <p:nvPr>
+            <p:ph type="title"/>
+          </p:nvPr>
+        </p:nvSpPr>
+        <p:spPr/>
+        <p:txBody>
+          <a:bodyPr/>
+          <a:lstStyle/>
+          <a:p>
+            <a:r>
+              <a:rPr lang="en-US" altLang="en-US" dirty="0"/>
+              <a:t>Ohm’s Law</a:t>
+            </a:r>
+          </a:p>
+        </p:txBody>
+      </p:sp>
+      <p:sp>
+        <p:nvSpPr>
+          <p:cNvPr id="22531" name="Rectangle 3"/>
+          <p:cNvSpPr>
+            <a:spLocks noGrp="1" noChangeArrowheads="1"/>
+          </p:cNvSpPr>
+          <p:nvPr>
+            <p:ph type="body" idx="1"/>
+          </p:nvPr>
+        </p:nvSpPr>
+        <p:spPr/>
+        <p:txBody>
+          <a:bodyPr/>
+          <a:lstStyle/>
+          <a:p>
+            <a:pPr>
+              <a:buFontTx/>
+              <a:buNone/>
+            </a:pPr>
+            <a:r>
+              <a:rPr lang="en-US" altLang="en-US" dirty="0"/>
+              <a:t>Ohm’s law</a:t>
+            </a:r>
+          </a:p>
+          <a:p>
+            <a:r>
+              <a:rPr lang="en-US" altLang="en-US" sz="2800" dirty="0"/>
+              <a:t>relationship between voltage, current, and resistance</a:t>
+            </a:r>
+          </a:p>
+          <a:p>
+            <a:r>
+              <a:rPr lang="en-US" altLang="en-US" sz="2800" dirty="0"/>
+              <a:t>states that the current in a circuit varies in direct proportion to the potential difference, or voltage, and inversely with the resistance</a:t>
+            </a:r>
+          </a:p>
+          <a:p>
+            <a:endParaRPr lang="en-US" altLang="en-US" dirty="0"/>
+          </a:p>
+        </p:txBody>
+      </p:sp>
+    </p:spTree>
+    <p:extLst>
+      <p:ext uri="{BB962C8B-B14F-4D97-AF65-F5344CB8AC3E}">
+        <p14:creationId xmlns:p14="http://schemas.microsoft.com/office/powerpoint/2010/main" val="905015609"/>
+      </p:ext>
+    </p:extLst>
+  </p:cSld>
+  <p:clrMapOvr>
+    <a:masterClrMapping/>
+  </p:clrMapOvr>
+</p:sld>
+</file>
+
+<file path=ppt/slides/slide23.xml><?xml version="1.0" encoding="utf-8"?>
+<p:sld xmlns:a="http://schemas.openxmlformats.org/drawingml/2006/main" xmlns:r="http://schemas.openxmlformats.org/officeDocument/2006/relationships" xmlns:p="http://schemas.openxmlformats.org/presentationml/2006/main">
+  <p:cSld>
+    <p:spTree>
+      <p:nvGrpSpPr>
+        <p:cNvPr id="1" name=""/>
+        <p:cNvGrpSpPr/>
+        <p:nvPr/>
+      </p:nvGrpSpPr>
+      <p:grpSpPr>
+        <a:xfrm>
+          <a:off x="0" y="0"/>
+          <a:ext cx="0" cy="0"/>
+          <a:chOff x="0" y="0"/>
+          <a:chExt cx="0" cy="0"/>
+        </a:xfrm>
+      </p:grpSpPr>
+      <p:sp>
+        <p:nvSpPr>
+          <p:cNvPr id="53250" name="Rectangle 2"/>
+          <p:cNvSpPr>
+            <a:spLocks noGrp="1" noChangeArrowheads="1"/>
+          </p:cNvSpPr>
+          <p:nvPr>
+            <p:ph type="title"/>
+          </p:nvPr>
+        </p:nvSpPr>
+        <p:spPr/>
+        <p:txBody>
+          <a:bodyPr/>
+          <a:lstStyle/>
+          <a:p>
+            <a:r>
+              <a:rPr lang="en-US" altLang="en-US" dirty="0"/>
+              <a:t>Ohm’s Law</a:t>
+            </a:r>
+          </a:p>
+        </p:txBody>
+      </p:sp>
+      <p:sp>
+        <p:nvSpPr>
+          <p:cNvPr id="53251" name="Rectangle 3"/>
           <p:cNvSpPr>
             <a:spLocks noGrp="1" noChangeArrowheads="1"/>
           </p:cNvSpPr>
@@ -5780,19 +7280,13 @@
             </a:pPr>
             <a:r>
               <a:rPr lang="en-US" altLang="en-US" dirty="0"/>
-              <a:t>Coulomb’s law (continued)</a:t>
+              <a:t>Ohm’s law (continued)</a:t>
             </a:r>
           </a:p>
           <a:p>
             <a:r>
               <a:rPr lang="en-US" altLang="en-US" sz="2800" dirty="0"/>
-              <a:t>If the charges are alike in sign, the force is repelling; if the charges are not alike, the force is attractive.</a:t>
-            </a:r>
-          </a:p>
-          <a:p>
-            <a:r>
-              <a:rPr lang="en-US" altLang="en-US" sz="2800" dirty="0"/>
-              <a:t>in equation form: 			</a:t>
+              <a:t>in equation form:</a:t>
             </a:r>
           </a:p>
           <a:p>
@@ -5802,37 +7296,47 @@
             </a:pPr>
             <a:r>
               <a:rPr lang="en-US" altLang="en-US" sz="2800" dirty="0"/>
-              <a:t>					k = 9,000,000,000 Nm</a:t>
-            </a:r>
-            <a:r>
-              <a:rPr lang="en-US" altLang="en-US" sz="2800" baseline="30000" dirty="0"/>
-              <a:t>2</a:t>
-            </a:r>
+              <a:t>	example: </a:t>
+            </a:r>
+          </a:p>
+          <a:p>
+            <a:pPr lvl="1">
+              <a:buFont typeface="Times" panose="02020603050405020304" pitchFamily="18" charset="0"/>
+              <a:buChar char="•"/>
+            </a:pPr>
+            <a:r>
+              <a:rPr lang="en-US" altLang="en-US" sz="2400" dirty="0"/>
+              <a:t>for a constant resistance, current will be twice as much for twice the voltage</a:t>
+            </a:r>
+          </a:p>
+          <a:p>
+            <a:pPr lvl="1">
+              <a:buFont typeface="Times" panose="02020603050405020304" pitchFamily="18" charset="0"/>
+              <a:buChar char="•"/>
+            </a:pPr>
+            <a:r>
+              <a:rPr lang="en-US" altLang="en-US" sz="2400" dirty="0"/>
+              <a:t>for twice the resistance and twice the voltage, current will be unchanged</a:t>
+            </a:r>
+            <a:r>
+              <a:rPr lang="en-US" altLang="en-US" sz="2000" dirty="0"/>
+              <a:t> </a:t>
+            </a:r>
+          </a:p>
+          <a:p>
+            <a:pPr>
+              <a:buFontTx/>
+              <a:buNone/>
+            </a:pPr>
+            <a:r>
+              <a:rPr lang="en-US" altLang="en-US" dirty="0"/>
+              <a:t>Resistors</a:t>
+            </a:r>
+          </a:p>
+          <a:p>
             <a:r>
               <a:rPr lang="en-US" altLang="en-US" sz="2800" dirty="0"/>
-              <a:t>/C</a:t>
-            </a:r>
-            <a:r>
-              <a:rPr lang="en-US" altLang="en-US" sz="2800" baseline="30000" dirty="0"/>
-              <a:t>2</a:t>
-            </a:r>
-          </a:p>
-          <a:p>
-            <a:r>
-              <a:rPr lang="en-US" altLang="en-US" sz="2800" dirty="0"/>
-              <a:t>unit of charge is coulomb, C</a:t>
-            </a:r>
-          </a:p>
-          <a:p>
-            <a:r>
-              <a:rPr lang="en-US" altLang="en-US" sz="2800" dirty="0"/>
-              <a:t>similar to Newton’s law of gravitation for masses</a:t>
-            </a:r>
-          </a:p>
-          <a:p>
-            <a:r>
-              <a:rPr lang="en-US" altLang="en-US" sz="2800" dirty="0"/>
-              <a:t>underlies the bonding forces between molecules</a:t>
+              <a:t>circuit elements that regulate current inside electrical devices</a:t>
             </a:r>
             <a:endParaRPr lang="en-US" altLang="en-US" dirty="0"/>
           </a:p>
@@ -5840,36 +7344,36 @@
       </p:sp>
       <p:graphicFrame>
         <p:nvGraphicFramePr>
-          <p:cNvPr id="38916" name="Object 4"/>
+          <p:cNvPr id="53252" name="Object 4"/>
           <p:cNvGraphicFramePr>
             <a:graphicFrameLocks noChangeAspect="1"/>
           </p:cNvGraphicFramePr>
           <p:nvPr>
             <p:extLst>
               <p:ext uri="{D42A27DB-BD31-4B8C-83A1-F6EECF244321}">
-                <p14:modId xmlns:p14="http://schemas.microsoft.com/office/powerpoint/2010/main" val="2237152741"/>
+                <p14:modId xmlns:p14="http://schemas.microsoft.com/office/powerpoint/2010/main" val="3714259076"/>
               </p:ext>
             </p:extLst>
           </p:nvPr>
         </p:nvGraphicFramePr>
         <p:xfrm>
-          <a:off x="1295400" y="3733800"/>
-          <a:ext cx="1498600" cy="685800"/>
+          <a:off x="3733800" y="2092325"/>
+          <a:ext cx="3213100" cy="685800"/>
         </p:xfrm>
         <a:graphic>
           <a:graphicData uri="http://schemas.openxmlformats.org/presentationml/2006/ole">
             <mc:AlternateContent xmlns:mc="http://schemas.openxmlformats.org/markup-compatibility/2006">
               <mc:Choice xmlns:v="urn:schemas-microsoft-com:vml" Requires="v">
-                <p:oleObj spid="_x0000_s1029" name="Equation" r:id="rId3" imgW="1498600" imgH="685800" progId="Equation.3">
+                <p:oleObj spid="_x0000_s2054" name="Equation" r:id="rId3" imgW="3213000" imgH="685800" progId="Equation.DSMT4">
                   <p:embed/>
                 </p:oleObj>
               </mc:Choice>
               <mc:Fallback>
-                <p:oleObj name="Equation" r:id="rId3" imgW="1498600" imgH="685800" progId="Equation.3">
+                <p:oleObj name="Equation" r:id="rId3" imgW="3213000" imgH="685800" progId="Equation.DSMT4">
                   <p:embed/>
                   <p:pic>
                     <p:nvPicPr>
-                      <p:cNvPr id="38916" name="Object 4"/>
+                      <p:cNvPr id="53252" name="Object 4"/>
                       <p:cNvPicPr>
                         <a:picLocks noChangeAspect="1" noChangeArrowheads="1"/>
                       </p:cNvPicPr>
@@ -5890,8 +7394,8 @@
                     </p:blipFill>
                     <p:spPr bwMode="auto">
                       <a:xfrm>
-                        <a:off x="1295400" y="3733800"/>
-                        <a:ext cx="1498600" cy="685800"/>
+                        <a:off x="3733800" y="2092325"/>
+                        <a:ext cx="3213100" cy="685800"/>
                       </a:xfrm>
                       <a:prstGeom prst="rect">
                         <a:avLst/>
@@ -5940,7 +7444,7 @@
     </p:spTree>
     <p:extLst>
       <p:ext uri="{BB962C8B-B14F-4D97-AF65-F5344CB8AC3E}">
-        <p14:creationId xmlns:p14="http://schemas.microsoft.com/office/powerpoint/2010/main" val="171656914"/>
+        <p14:creationId xmlns:p14="http://schemas.microsoft.com/office/powerpoint/2010/main" val="1698767034"/>
       </p:ext>
     </p:extLst>
   </p:cSld>
@@ -5950,7 +7454,7 @@
 </p:sld>
 </file>
 
-<file path=ppt/slides/slide16.xml><?xml version="1.0" encoding="utf-8"?>
+<file path=ppt/slides/slide24.xml><?xml version="1.0" encoding="utf-8"?>
 <p:sld xmlns:a="http://schemas.openxmlformats.org/drawingml/2006/main" xmlns:r="http://schemas.openxmlformats.org/officeDocument/2006/relationships" xmlns:p="http://schemas.openxmlformats.org/presentationml/2006/main">
   <p:cSld>
     <p:spTree>
@@ -5969,195 +7473,87 @@
       </p:grpSpPr>
       <p:sp>
         <p:nvSpPr>
-          <p:cNvPr id="68610" name="Rectangle 1026"/>
+          <p:cNvPr id="55298" name="Rectangle 2"/>
           <p:cNvSpPr>
             <a:spLocks noGrp="1" noChangeArrowheads="1"/>
           </p:cNvSpPr>
           <p:nvPr>
             <p:ph type="title"/>
+          </p:nvPr>
+        </p:nvSpPr>
+        <p:spPr/>
+        <p:txBody>
+          <a:bodyPr/>
+          <a:lstStyle/>
+          <a:p>
+            <a:r>
+              <a:rPr lang="en-US" altLang="en-US" dirty="0"/>
+              <a:t>Electric Circuits</a:t>
+            </a:r>
+          </a:p>
+        </p:txBody>
+      </p:sp>
+      <p:sp>
+        <p:nvSpPr>
+          <p:cNvPr id="55299" name="Rectangle 3"/>
+          <p:cNvSpPr>
+            <a:spLocks noGrp="1" noChangeArrowheads="1"/>
+          </p:cNvSpPr>
+          <p:nvPr>
+            <p:ph type="body" idx="1"/>
           </p:nvPr>
         </p:nvSpPr>
         <p:spPr>
           <a:xfrm>
-            <a:off x="457200" y="990600"/>
-            <a:ext cx="8229600" cy="1752600"/>
+            <a:off x="457200" y="1295400"/>
+            <a:ext cx="8229600" cy="4530725"/>
           </a:xfrm>
         </p:spPr>
         <p:txBody>
           <a:bodyPr/>
           <a:lstStyle/>
           <a:p>
-            <a:pPr algn="l"/>
-            <a:r>
-              <a:rPr lang="en-US" altLang="en-US" sz="2400"/>
-              <a:t>According to Coulomb’s law, a pair of particles that are placed twice as far apart will experience forces that are</a:t>
-            </a:r>
-            <a:endParaRPr lang="en-US" altLang="en-US" sz="2800" b="1" i="1">
-              <a:latin typeface="Batang" pitchFamily="18" charset="-127"/>
-              <a:ea typeface="Batang" pitchFamily="18" charset="-127"/>
-            </a:endParaRPr>
-          </a:p>
-        </p:txBody>
-      </p:sp>
-      <p:sp>
-        <p:nvSpPr>
-          <p:cNvPr id="68611" name="Rectangle 1027"/>
-          <p:cNvSpPr>
-            <a:spLocks noGrp="1" noChangeArrowheads="1"/>
-          </p:cNvSpPr>
-          <p:nvPr>
-            <p:ph type="body" idx="1"/>
-          </p:nvPr>
-        </p:nvSpPr>
-        <p:spPr>
-          <a:xfrm>
-            <a:off x="457200" y="2895600"/>
-            <a:ext cx="8229600" cy="3962400"/>
-          </a:xfrm>
-        </p:spPr>
-        <p:txBody>
-          <a:bodyPr/>
-          <a:lstStyle/>
-          <a:p>
-            <a:pPr marL="609600" indent="-609600">
+            <a:pPr>
               <a:buFontTx/>
               <a:buNone/>
             </a:pPr>
             <a:r>
-              <a:rPr lang="en-US" altLang="en-US" sz="2000"/>
-              <a:t>A.	half as strong.</a:t>
-            </a:r>
-            <a:endParaRPr lang="en-US" altLang="en-US" sz="2000">
-              <a:ea typeface="Batang" pitchFamily="18" charset="-127"/>
-            </a:endParaRPr>
-          </a:p>
-          <a:p>
-            <a:pPr marL="609600" indent="-609600">
-              <a:buFontTx/>
-              <a:buAutoNum type="alphaUcPeriod" startAt="2"/>
-            </a:pPr>
-            <a:r>
-              <a:rPr lang="en-US" altLang="en-US" sz="2000"/>
-              <a:t>one-quarter as strong.</a:t>
-            </a:r>
-            <a:r>
-              <a:rPr lang="en-US" altLang="en-US" sz="2000" b="1">
-                <a:ea typeface="Batang" pitchFamily="18" charset="-127"/>
-              </a:rPr>
-              <a:t> </a:t>
-            </a:r>
-          </a:p>
-          <a:p>
-            <a:pPr marL="609600" indent="-609600">
-              <a:buFontTx/>
-              <a:buAutoNum type="alphaUcPeriod" startAt="2"/>
-            </a:pPr>
-            <a:r>
-              <a:rPr lang="en-US" altLang="en-US" sz="2000"/>
-              <a:t>twice as strong.</a:t>
-            </a:r>
-            <a:endParaRPr lang="en-US" altLang="en-US" sz="2000">
-              <a:ea typeface="Batang" pitchFamily="18" charset="-127"/>
-            </a:endParaRPr>
-          </a:p>
-          <a:p>
-            <a:pPr marL="609600" indent="-609600">
-              <a:buFontTx/>
-              <a:buAutoNum type="alphaUcPeriod" startAt="4"/>
-            </a:pPr>
-            <a:r>
-              <a:rPr lang="en-US" altLang="en-US" sz="2000"/>
-              <a:t>four times as strong.</a:t>
-            </a:r>
-          </a:p>
-          <a:p>
-            <a:pPr marL="609600" indent="-609600">
-              <a:buFontTx/>
-              <a:buNone/>
-            </a:pPr>
-            <a:endParaRPr lang="en-US" altLang="en-US" sz="2000"/>
-          </a:p>
-        </p:txBody>
-      </p:sp>
-      <p:sp>
-        <p:nvSpPr>
-          <p:cNvPr id="68612" name="Rectangle 1028"/>
-          <p:cNvSpPr>
-            <a:spLocks noChangeArrowheads="1"/>
-          </p:cNvSpPr>
-          <p:nvPr/>
-        </p:nvSpPr>
-        <p:spPr bwMode="auto">
-          <a:xfrm>
-            <a:off x="0" y="0"/>
-            <a:ext cx="9144000" cy="762000"/>
-          </a:xfrm>
-          <a:prstGeom prst="rect">
-            <a:avLst/>
-          </a:prstGeom>
-          <a:solidFill>
-            <a:srgbClr val="3B79AC"/>
-          </a:solidFill>
-          <a:ln>
-            <a:noFill/>
-          </a:ln>
-          <a:effectLst/>
-          <a:extLst>
-            <a:ext uri="{91240B29-F687-4F45-9708-019B960494DF}">
-              <a14:hiddenLine xmlns:a14="http://schemas.microsoft.com/office/drawing/2010/main" w="9525">
-                <a:solidFill>
-                  <a:schemeClr val="tx1"/>
-                </a:solidFill>
-                <a:miter lim="800000"/>
-                <a:headEnd/>
-                <a:tailEnd/>
-              </a14:hiddenLine>
-            </a:ext>
-            <a:ext uri="{AF507438-7753-43E0-B8FC-AC1667EBCBE1}">
-              <a14:hiddenEffects xmlns:a14="http://schemas.microsoft.com/office/drawing/2010/main">
-                <a:effectLst>
-                  <a:outerShdw dist="35921" dir="2700000" algn="ctr" rotWithShape="0">
-                    <a:schemeClr val="bg2"/>
-                  </a:outerShdw>
-                </a:effectLst>
-              </a14:hiddenEffects>
-            </a:ext>
-          </a:extLst>
-        </p:spPr>
-        <p:txBody>
-          <a:bodyPr wrap="none" anchor="ctr"/>
-          <a:lstStyle/>
-          <a:p>
-            <a:pPr algn="ctr"/>
-            <a:r>
-              <a:rPr lang="en-US" altLang="en-US" sz="2400" b="1">
-                <a:solidFill>
-                  <a:schemeClr val="bg1"/>
-                </a:solidFill>
-                <a:cs typeface="Arial" panose="020B0604020202020204" pitchFamily="34" charset="0"/>
-              </a:rPr>
-              <a:t>Coulomb’s Law</a:t>
-            </a:r>
-          </a:p>
-          <a:p>
-            <a:pPr algn="ctr"/>
-            <a:r>
-              <a:rPr lang="en-US" altLang="en-US" sz="2400" b="1">
-                <a:solidFill>
-                  <a:schemeClr val="bg1"/>
-                </a:solidFill>
-                <a:cs typeface="Arial" panose="020B0604020202020204" pitchFamily="34" charset="0"/>
-              </a:rPr>
-              <a:t>CHECK YOUR NEIGHBOR</a:t>
-            </a:r>
-            <a:r>
-              <a:rPr lang="en-US" altLang="en-US" sz="2400" b="1" i="1">
-                <a:solidFill>
-                  <a:schemeClr val="bg1"/>
-                </a:solidFill>
-                <a:cs typeface="Arial" panose="020B0604020202020204" pitchFamily="34" charset="0"/>
-              </a:rPr>
-              <a:t> </a:t>
+              <a:rPr lang="en-US" altLang="en-US" dirty="0"/>
+              <a:t>Circuits</a:t>
+            </a:r>
+          </a:p>
+          <a:p>
+            <a:r>
+              <a:rPr lang="en-US" altLang="en-US" sz="2800" dirty="0"/>
+              <a:t>connected in two common ways</a:t>
+            </a:r>
+          </a:p>
+          <a:p>
+            <a:pPr lvl="1"/>
+            <a:r>
+              <a:rPr lang="en-US" altLang="en-US" sz="2400" dirty="0"/>
+              <a:t>series</a:t>
+            </a:r>
+          </a:p>
+          <a:p>
+            <a:pPr lvl="2"/>
+            <a:r>
+              <a:rPr lang="en-US" altLang="en-US" dirty="0"/>
+              <a:t>forms a single pathway for electron flow between the terminals of the battery, generator, or wall outlet</a:t>
+            </a:r>
+          </a:p>
+          <a:p>
+            <a:pPr lvl="1"/>
+            <a:r>
+              <a:rPr lang="en-US" altLang="en-US" sz="2400" dirty="0"/>
+              <a:t>parallel</a:t>
+            </a:r>
+          </a:p>
+          <a:p>
+            <a:pPr lvl="2"/>
+            <a:r>
+              <a:rPr lang="en-US" altLang="en-US" dirty="0"/>
+              <a:t>forms branches, each of which is a separate path for the flow of electrons</a:t>
             </a:r>
           </a:p>
         </p:txBody>
@@ -6165,1098 +7561,7 @@
     </p:spTree>
     <p:extLst>
       <p:ext uri="{BB962C8B-B14F-4D97-AF65-F5344CB8AC3E}">
-        <p14:creationId xmlns:p14="http://schemas.microsoft.com/office/powerpoint/2010/main" val="1698730843"/>
-      </p:ext>
-    </p:extLst>
-  </p:cSld>
-  <p:clrMapOvr>
-    <a:masterClrMapping/>
-  </p:clrMapOvr>
-</p:sld>
-</file>
-
-<file path=ppt/slides/slide17.xml><?xml version="1.0" encoding="utf-8"?>
-<p:sld xmlns:a="http://schemas.openxmlformats.org/drawingml/2006/main" xmlns:r="http://schemas.openxmlformats.org/officeDocument/2006/relationships" xmlns:p="http://schemas.openxmlformats.org/presentationml/2006/main">
-  <p:cSld>
-    <p:spTree>
-      <p:nvGrpSpPr>
-        <p:cNvPr id="1" name=""/>
-        <p:cNvGrpSpPr/>
-        <p:nvPr/>
-      </p:nvGrpSpPr>
-      <p:grpSpPr>
-        <a:xfrm>
-          <a:off x="0" y="0"/>
-          <a:ext cx="0" cy="0"/>
-          <a:chOff x="0" y="0"/>
-          <a:chExt cx="0" cy="0"/>
-        </a:xfrm>
-      </p:grpSpPr>
-      <p:sp>
-        <p:nvSpPr>
-          <p:cNvPr id="70658" name="Rectangle 1026"/>
-          <p:cNvSpPr>
-            <a:spLocks noGrp="1" noChangeArrowheads="1"/>
-          </p:cNvSpPr>
-          <p:nvPr>
-            <p:ph type="title"/>
-          </p:nvPr>
-        </p:nvSpPr>
-        <p:spPr>
-          <a:xfrm>
-            <a:off x="457200" y="990600"/>
-            <a:ext cx="8229600" cy="1752600"/>
-          </a:xfrm>
-        </p:spPr>
-        <p:txBody>
-          <a:bodyPr/>
-          <a:lstStyle/>
-          <a:p>
-            <a:pPr algn="l"/>
-            <a:r>
-              <a:rPr lang="en-US" altLang="en-US" sz="2400"/>
-              <a:t>According to Coulomb’s law, a pair of particles that are placed twice as far apart will experience forces that are</a:t>
-            </a:r>
-          </a:p>
-        </p:txBody>
-      </p:sp>
-      <p:sp>
-        <p:nvSpPr>
-          <p:cNvPr id="70659" name="Rectangle 1027"/>
-          <p:cNvSpPr>
-            <a:spLocks noGrp="1" noChangeArrowheads="1"/>
-          </p:cNvSpPr>
-          <p:nvPr>
-            <p:ph type="body" idx="1"/>
-          </p:nvPr>
-        </p:nvSpPr>
-        <p:spPr>
-          <a:xfrm>
-            <a:off x="457200" y="2895600"/>
-            <a:ext cx="8229600" cy="3962400"/>
-          </a:xfrm>
-        </p:spPr>
-        <p:txBody>
-          <a:bodyPr/>
-          <a:lstStyle/>
-          <a:p>
-            <a:pPr marL="609600" indent="-609600">
-              <a:buFontTx/>
-              <a:buNone/>
-            </a:pPr>
-            <a:r>
-              <a:rPr lang="en-US" altLang="en-US" sz="2000"/>
-              <a:t>A.	half as strong.</a:t>
-            </a:r>
-            <a:endParaRPr lang="en-US" altLang="en-US" sz="2000">
-              <a:ea typeface="Batang" pitchFamily="18" charset="-127"/>
-            </a:endParaRPr>
-          </a:p>
-          <a:p>
-            <a:pPr marL="609600" indent="-609600">
-              <a:buFontTx/>
-              <a:buAutoNum type="alphaUcPeriod" startAt="2"/>
-            </a:pPr>
-            <a:r>
-              <a:rPr lang="en-US" altLang="en-US" sz="2000" b="1"/>
-              <a:t>one-quarter as strong.</a:t>
-            </a:r>
-            <a:r>
-              <a:rPr lang="en-US" altLang="en-US" sz="2000" b="1">
-                <a:ea typeface="Batang" pitchFamily="18" charset="-127"/>
-              </a:rPr>
-              <a:t> </a:t>
-            </a:r>
-          </a:p>
-          <a:p>
-            <a:pPr marL="609600" indent="-609600">
-              <a:buFontTx/>
-              <a:buAutoNum type="alphaUcPeriod" startAt="2"/>
-            </a:pPr>
-            <a:r>
-              <a:rPr lang="en-US" altLang="en-US" sz="2000"/>
-              <a:t>twice as strong.</a:t>
-            </a:r>
-            <a:endParaRPr lang="en-US" altLang="en-US" sz="2000">
-              <a:ea typeface="Batang" pitchFamily="18" charset="-127"/>
-            </a:endParaRPr>
-          </a:p>
-          <a:p>
-            <a:pPr marL="609600" indent="-609600">
-              <a:buFontTx/>
-              <a:buAutoNum type="alphaUcPeriod" startAt="4"/>
-            </a:pPr>
-            <a:r>
-              <a:rPr lang="en-US" altLang="en-US" sz="2000"/>
-              <a:t>four times as strong.</a:t>
-            </a:r>
-          </a:p>
-          <a:p>
-            <a:pPr marL="609600" indent="-609600">
-              <a:buFontTx/>
-              <a:buNone/>
-            </a:pPr>
-            <a:endParaRPr lang="en-US" altLang="en-US" sz="2000"/>
-          </a:p>
-        </p:txBody>
-      </p:sp>
-      <p:sp>
-        <p:nvSpPr>
-          <p:cNvPr id="70660" name="Rectangle 1028"/>
-          <p:cNvSpPr>
-            <a:spLocks noChangeArrowheads="1"/>
-          </p:cNvSpPr>
-          <p:nvPr/>
-        </p:nvSpPr>
-        <p:spPr bwMode="auto">
-          <a:xfrm>
-            <a:off x="0" y="0"/>
-            <a:ext cx="9144000" cy="762000"/>
-          </a:xfrm>
-          <a:prstGeom prst="rect">
-            <a:avLst/>
-          </a:prstGeom>
-          <a:solidFill>
-            <a:srgbClr val="3B79AC"/>
-          </a:solidFill>
-          <a:ln>
-            <a:noFill/>
-          </a:ln>
-          <a:effectLst/>
-          <a:extLst>
-            <a:ext uri="{91240B29-F687-4F45-9708-019B960494DF}">
-              <a14:hiddenLine xmlns:a14="http://schemas.microsoft.com/office/drawing/2010/main" w="9525">
-                <a:solidFill>
-                  <a:schemeClr val="tx1"/>
-                </a:solidFill>
-                <a:miter lim="800000"/>
-                <a:headEnd/>
-                <a:tailEnd/>
-              </a14:hiddenLine>
-            </a:ext>
-            <a:ext uri="{AF507438-7753-43E0-B8FC-AC1667EBCBE1}">
-              <a14:hiddenEffects xmlns:a14="http://schemas.microsoft.com/office/drawing/2010/main">
-                <a:effectLst>
-                  <a:outerShdw dist="35921" dir="2700000" algn="ctr" rotWithShape="0">
-                    <a:schemeClr val="bg2"/>
-                  </a:outerShdw>
-                </a:effectLst>
-              </a14:hiddenEffects>
-            </a:ext>
-          </a:extLst>
-        </p:spPr>
-        <p:txBody>
-          <a:bodyPr wrap="none" anchor="ctr"/>
-          <a:lstStyle/>
-          <a:p>
-            <a:pPr algn="ctr"/>
-            <a:r>
-              <a:rPr lang="en-US" altLang="en-US" sz="2400" b="1">
-                <a:solidFill>
-                  <a:schemeClr val="bg1"/>
-                </a:solidFill>
-                <a:cs typeface="Arial" panose="020B0604020202020204" pitchFamily="34" charset="0"/>
-              </a:rPr>
-              <a:t>Coulomb’s Law</a:t>
-            </a:r>
-          </a:p>
-          <a:p>
-            <a:pPr algn="ctr"/>
-            <a:r>
-              <a:rPr lang="en-US" altLang="en-US" sz="2400" b="1">
-                <a:solidFill>
-                  <a:schemeClr val="bg1"/>
-                </a:solidFill>
-                <a:cs typeface="Arial" panose="020B0604020202020204" pitchFamily="34" charset="0"/>
-              </a:rPr>
-              <a:t>CHECK YOUR ANSWER</a:t>
-            </a:r>
-            <a:endParaRPr lang="en-US" altLang="en-US" sz="2400" b="1" i="1">
-              <a:solidFill>
-                <a:schemeClr val="bg1"/>
-              </a:solidFill>
-              <a:cs typeface="Arial" panose="020B0604020202020204" pitchFamily="34" charset="0"/>
-            </a:endParaRPr>
-          </a:p>
-        </p:txBody>
-      </p:sp>
-    </p:spTree>
-    <p:extLst>
-      <p:ext uri="{BB962C8B-B14F-4D97-AF65-F5344CB8AC3E}">
-        <p14:creationId xmlns:p14="http://schemas.microsoft.com/office/powerpoint/2010/main" val="2792510912"/>
-      </p:ext>
-    </p:extLst>
-  </p:cSld>
-  <p:clrMapOvr>
-    <a:masterClrMapping/>
-  </p:clrMapOvr>
-</p:sld>
-</file>
-
-<file path=ppt/slides/slide18.xml><?xml version="1.0" encoding="utf-8"?>
-<p:sld xmlns:a="http://schemas.openxmlformats.org/drawingml/2006/main" xmlns:r="http://schemas.openxmlformats.org/officeDocument/2006/relationships" xmlns:p="http://schemas.openxmlformats.org/presentationml/2006/main">
-  <p:cSld>
-    <p:spTree>
-      <p:nvGrpSpPr>
-        <p:cNvPr id="1" name=""/>
-        <p:cNvGrpSpPr/>
-        <p:nvPr/>
-      </p:nvGrpSpPr>
-      <p:grpSpPr>
-        <a:xfrm>
-          <a:off x="0" y="0"/>
-          <a:ext cx="0" cy="0"/>
-          <a:chOff x="0" y="0"/>
-          <a:chExt cx="0" cy="0"/>
-        </a:xfrm>
-      </p:grpSpPr>
-      <p:sp>
-        <p:nvSpPr>
-          <p:cNvPr id="39938" name="Rectangle 1026"/>
-          <p:cNvSpPr>
-            <a:spLocks noGrp="1" noChangeArrowheads="1"/>
-          </p:cNvSpPr>
-          <p:nvPr>
-            <p:ph type="title"/>
-          </p:nvPr>
-        </p:nvSpPr>
-        <p:spPr/>
-        <p:txBody>
-          <a:bodyPr/>
-          <a:lstStyle/>
-          <a:p>
-            <a:r>
-              <a:rPr lang="en-US" altLang="en-US"/>
-              <a:t>Coulomb’s Law</a:t>
-            </a:r>
-          </a:p>
-        </p:txBody>
-      </p:sp>
-      <p:sp>
-        <p:nvSpPr>
-          <p:cNvPr id="39939" name="Rectangle 1027"/>
-          <p:cNvSpPr>
-            <a:spLocks noGrp="1" noChangeArrowheads="1"/>
-          </p:cNvSpPr>
-          <p:nvPr>
-            <p:ph type="body" idx="1"/>
-          </p:nvPr>
-        </p:nvSpPr>
-        <p:spPr/>
-        <p:txBody>
-          <a:bodyPr/>
-          <a:lstStyle/>
-          <a:p>
-            <a:pPr marL="0" indent="0">
-              <a:buFontTx/>
-              <a:buNone/>
-            </a:pPr>
-            <a:r>
-              <a:rPr lang="en-US" altLang="en-US"/>
-              <a:t>Differences between gravitational and electrical forces</a:t>
-            </a:r>
-          </a:p>
-          <a:p>
-            <a:pPr marL="400050" lvl="1">
-              <a:buFontTx/>
-              <a:buChar char="•"/>
-            </a:pPr>
-            <a:r>
-              <a:rPr lang="en-US" altLang="en-US" sz="2400"/>
-              <a:t>electrical forces may be either attractive or repulsive</a:t>
-            </a:r>
-          </a:p>
-          <a:p>
-            <a:pPr marL="400050" lvl="1">
-              <a:buFontTx/>
-              <a:buChar char="•"/>
-            </a:pPr>
-            <a:r>
-              <a:rPr lang="en-US" altLang="en-US" sz="2400"/>
-              <a:t>gravitational forces are only attractive</a:t>
-            </a:r>
-            <a:endParaRPr lang="en-US" altLang="en-US"/>
-          </a:p>
-        </p:txBody>
-      </p:sp>
-    </p:spTree>
-    <p:extLst>
-      <p:ext uri="{BB962C8B-B14F-4D97-AF65-F5344CB8AC3E}">
-        <p14:creationId xmlns:p14="http://schemas.microsoft.com/office/powerpoint/2010/main" val="3307108611"/>
-      </p:ext>
-    </p:extLst>
-  </p:cSld>
-  <p:clrMapOvr>
-    <a:masterClrMapping/>
-  </p:clrMapOvr>
-</p:sld>
-</file>
-
-<file path=ppt/slides/slide19.xml><?xml version="1.0" encoding="utf-8"?>
-<p:sld xmlns:a="http://schemas.openxmlformats.org/drawingml/2006/main" xmlns:r="http://schemas.openxmlformats.org/officeDocument/2006/relationships" xmlns:p="http://schemas.openxmlformats.org/presentationml/2006/main">
-  <p:cSld>
-    <p:spTree>
-      <p:nvGrpSpPr>
-        <p:cNvPr id="1" name=""/>
-        <p:cNvGrpSpPr/>
-        <p:nvPr/>
-      </p:nvGrpSpPr>
-      <p:grpSpPr>
-        <a:xfrm>
-          <a:off x="0" y="0"/>
-          <a:ext cx="0" cy="0"/>
-          <a:chOff x="0" y="0"/>
-          <a:chExt cx="0" cy="0"/>
-        </a:xfrm>
-      </p:grpSpPr>
-      <p:sp>
-        <p:nvSpPr>
-          <p:cNvPr id="40962" name="Rectangle 2"/>
-          <p:cNvSpPr>
-            <a:spLocks noGrp="1" noChangeArrowheads="1"/>
-          </p:cNvSpPr>
-          <p:nvPr>
-            <p:ph type="title"/>
-          </p:nvPr>
-        </p:nvSpPr>
-        <p:spPr>
-          <a:xfrm>
-            <a:off x="457200" y="76200"/>
-            <a:ext cx="8229600" cy="1143000"/>
-          </a:xfrm>
-        </p:spPr>
-        <p:txBody>
-          <a:bodyPr/>
-          <a:lstStyle/>
-          <a:p>
-            <a:r>
-              <a:rPr lang="en-US" altLang="en-US" dirty="0"/>
-              <a:t>Coulomb’s Law</a:t>
-            </a:r>
-          </a:p>
-        </p:txBody>
-      </p:sp>
-      <p:sp>
-        <p:nvSpPr>
-          <p:cNvPr id="40963" name="Rectangle 3"/>
-          <p:cNvSpPr>
-            <a:spLocks noGrp="1" noChangeArrowheads="1"/>
-          </p:cNvSpPr>
-          <p:nvPr>
-            <p:ph type="body" idx="1"/>
-          </p:nvPr>
-        </p:nvSpPr>
-        <p:spPr>
-          <a:xfrm>
-            <a:off x="457200" y="1143000"/>
-            <a:ext cx="8229600" cy="4525963"/>
-          </a:xfrm>
-        </p:spPr>
-        <p:txBody>
-          <a:bodyPr/>
-          <a:lstStyle/>
-          <a:p>
-            <a:pPr>
-              <a:lnSpc>
-                <a:spcPct val="80000"/>
-              </a:lnSpc>
-              <a:buFontTx/>
-              <a:buNone/>
-            </a:pPr>
-            <a:r>
-              <a:rPr lang="en-US" altLang="en-US" sz="2800"/>
-              <a:t>Charge polarization</a:t>
-            </a:r>
-          </a:p>
-          <a:p>
-            <a:pPr>
-              <a:lnSpc>
-                <a:spcPct val="80000"/>
-              </a:lnSpc>
-            </a:pPr>
-            <a:r>
-              <a:rPr lang="en-US" altLang="en-US" sz="2400"/>
-              <a:t>Atom or molecule in which the charges are aligned with a slight excess of positive charge on one side and slight excess of negative charge on the other.</a:t>
-            </a:r>
-          </a:p>
-          <a:p>
-            <a:pPr>
-              <a:lnSpc>
-                <a:spcPct val="80000"/>
-              </a:lnSpc>
-            </a:pPr>
-            <a:r>
-              <a:rPr lang="en-US" altLang="en-US" sz="2400"/>
-              <a:t>example: </a:t>
-            </a:r>
-            <a:r>
-              <a:rPr lang="en-US" altLang="en-US" sz="700"/>
-              <a:t> </a:t>
-            </a:r>
-            <a:r>
-              <a:rPr lang="en-US" altLang="en-US" sz="2000"/>
-              <a:t>Rub an inflated balloon on</a:t>
-            </a:r>
-          </a:p>
-          <a:p>
-            <a:pPr>
-              <a:lnSpc>
-                <a:spcPct val="80000"/>
-              </a:lnSpc>
-              <a:buFontTx/>
-              <a:buNone/>
-            </a:pPr>
-            <a:r>
-              <a:rPr lang="en-US" altLang="en-US" sz="2000"/>
-              <a:t>		           your hair and place the</a:t>
-            </a:r>
-          </a:p>
-          <a:p>
-            <a:pPr>
-              <a:lnSpc>
-                <a:spcPct val="80000"/>
-              </a:lnSpc>
-              <a:buFontTx/>
-              <a:buNone/>
-            </a:pPr>
-            <a:r>
-              <a:rPr lang="en-US" altLang="en-US" sz="2000"/>
-              <a:t>		           balloon on the wall. The</a:t>
-            </a:r>
-          </a:p>
-          <a:p>
-            <a:pPr>
-              <a:lnSpc>
-                <a:spcPct val="80000"/>
-              </a:lnSpc>
-              <a:buFontTx/>
-              <a:buNone/>
-            </a:pPr>
-            <a:r>
-              <a:rPr lang="en-US" altLang="en-US" sz="2000"/>
-              <a:t>		           balloon sticks to the wall</a:t>
-            </a:r>
-          </a:p>
-          <a:p>
-            <a:pPr>
-              <a:lnSpc>
-                <a:spcPct val="80000"/>
-              </a:lnSpc>
-              <a:buFontTx/>
-              <a:buNone/>
-            </a:pPr>
-            <a:r>
-              <a:rPr lang="en-US" altLang="en-US" sz="2000"/>
-              <a:t>		           due to charge polarization in</a:t>
-            </a:r>
-          </a:p>
-          <a:p>
-            <a:pPr>
-              <a:lnSpc>
-                <a:spcPct val="80000"/>
-              </a:lnSpc>
-              <a:buFontTx/>
-              <a:buNone/>
-            </a:pPr>
-            <a:r>
-              <a:rPr lang="en-US" altLang="en-US" sz="2000"/>
-              <a:t>		           the atoms or molecules of</a:t>
-            </a:r>
-          </a:p>
-          <a:p>
-            <a:pPr>
-              <a:lnSpc>
-                <a:spcPct val="80000"/>
-              </a:lnSpc>
-              <a:buFontTx/>
-              <a:buNone/>
-            </a:pPr>
-            <a:r>
-              <a:rPr lang="en-US" altLang="en-US" sz="2000"/>
-              <a:t>		           the wall.</a:t>
-            </a:r>
-            <a:br>
-              <a:rPr lang="en-US" altLang="en-US" sz="2000"/>
-            </a:br>
-            <a:endParaRPr lang="en-US" altLang="en-US" sz="2000"/>
-          </a:p>
-          <a:p>
-            <a:pPr>
-              <a:lnSpc>
-                <a:spcPct val="80000"/>
-              </a:lnSpc>
-              <a:buFontTx/>
-              <a:buNone/>
-            </a:pPr>
-            <a:br>
-              <a:rPr lang="en-US" altLang="en-US" sz="1600"/>
-            </a:br>
-            <a:endParaRPr lang="en-US" altLang="en-US" sz="1600"/>
-          </a:p>
-        </p:txBody>
-      </p:sp>
-      <p:pic>
-        <p:nvPicPr>
-          <p:cNvPr id="40964" name="Picture 4" descr="10_07Figure-F"/>
-          <p:cNvPicPr>
-            <a:picLocks noChangeAspect="1" noChangeArrowheads="1"/>
-          </p:cNvPicPr>
-          <p:nvPr/>
-        </p:nvPicPr>
-        <p:blipFill>
-          <a:blip r:embed="rId2" cstate="print">
-            <a:extLst>
-              <a:ext uri="{28A0092B-C50C-407E-A947-70E740481C1C}">
-                <a14:useLocalDpi xmlns:a14="http://schemas.microsoft.com/office/drawing/2010/main" val="0"/>
-              </a:ext>
-            </a:extLst>
-          </a:blip>
-          <a:srcRect b="2531"/>
-          <a:stretch>
-            <a:fillRect/>
-          </a:stretch>
-        </p:blipFill>
-        <p:spPr bwMode="auto">
-          <a:xfrm>
-            <a:off x="5867400" y="2667000"/>
-            <a:ext cx="2514600" cy="2466975"/>
-          </a:xfrm>
-          <a:prstGeom prst="rect">
-            <a:avLst/>
-          </a:prstGeom>
-          <a:noFill/>
-          <a:extLst>
-            <a:ext uri="{909E8E84-426E-40DD-AFC4-6F175D3DCCD1}">
-              <a14:hiddenFill xmlns:a14="http://schemas.microsoft.com/office/drawing/2010/main">
-                <a:solidFill>
-                  <a:srgbClr val="FFFFFF"/>
-                </a:solidFill>
-              </a14:hiddenFill>
-            </a:ext>
-          </a:extLst>
-        </p:spPr>
-      </p:pic>
-    </p:spTree>
-    <p:extLst>
-      <p:ext uri="{BB962C8B-B14F-4D97-AF65-F5344CB8AC3E}">
-        <p14:creationId xmlns:p14="http://schemas.microsoft.com/office/powerpoint/2010/main" val="3143685688"/>
-      </p:ext>
-    </p:extLst>
-  </p:cSld>
-  <p:clrMapOvr>
-    <a:masterClrMapping/>
-  </p:clrMapOvr>
-</p:sld>
-</file>
-
-<file path=ppt/slides/slide2.xml><?xml version="1.0" encoding="utf-8"?>
-<p:sld xmlns:a="http://schemas.openxmlformats.org/drawingml/2006/main" xmlns:r="http://schemas.openxmlformats.org/officeDocument/2006/relationships" xmlns:p="http://schemas.openxmlformats.org/presentationml/2006/main">
-  <p:cSld>
-    <p:spTree>
-      <p:nvGrpSpPr>
-        <p:cNvPr id="1" name=""/>
-        <p:cNvGrpSpPr/>
-        <p:nvPr/>
-      </p:nvGrpSpPr>
-      <p:grpSpPr>
-        <a:xfrm>
-          <a:off x="0" y="0"/>
-          <a:ext cx="0" cy="0"/>
-          <a:chOff x="0" y="0"/>
-          <a:chExt cx="0" cy="0"/>
-        </a:xfrm>
-      </p:grpSpPr>
-      <p:sp>
-        <p:nvSpPr>
-          <p:cNvPr id="2" name="Title 1"/>
-          <p:cNvSpPr>
-            <a:spLocks noGrp="1"/>
-          </p:cNvSpPr>
-          <p:nvPr>
-            <p:ph type="title"/>
-          </p:nvPr>
-        </p:nvSpPr>
-        <p:spPr>
-          <a:xfrm>
-            <a:off x="381000" y="152400"/>
-            <a:ext cx="8229600" cy="1139825"/>
-          </a:xfrm>
-        </p:spPr>
-        <p:txBody>
-          <a:bodyPr/>
-          <a:lstStyle/>
-          <a:p>
-            <a:r>
-              <a:rPr lang="en-US" dirty="0"/>
-              <a:t>Agenda </a:t>
-            </a:r>
-          </a:p>
-        </p:txBody>
-      </p:sp>
-      <p:sp>
-        <p:nvSpPr>
-          <p:cNvPr id="3" name="Content Placeholder 2"/>
-          <p:cNvSpPr>
-            <a:spLocks noGrp="1"/>
-          </p:cNvSpPr>
-          <p:nvPr>
-            <p:ph idx="1"/>
-          </p:nvPr>
-        </p:nvSpPr>
-        <p:spPr>
-          <a:xfrm>
-            <a:off x="381000" y="1143000"/>
-            <a:ext cx="8229600" cy="4530725"/>
-          </a:xfrm>
-        </p:spPr>
-        <p:txBody>
-          <a:bodyPr/>
-          <a:lstStyle/>
-          <a:p>
-            <a:r>
-              <a:rPr lang="en-US" dirty="0"/>
-              <a:t>Electric Charge</a:t>
-            </a:r>
-          </a:p>
-          <a:p>
-            <a:r>
-              <a:rPr lang="en-US" dirty="0"/>
-              <a:t>Coulombs Law</a:t>
-            </a:r>
-          </a:p>
-          <a:p>
-            <a:r>
-              <a:rPr lang="en-US" dirty="0"/>
-              <a:t>The Electric Field </a:t>
-            </a:r>
-          </a:p>
-          <a:p>
-            <a:r>
-              <a:rPr lang="en-US" dirty="0"/>
-              <a:t>Lab: Electricity</a:t>
-            </a:r>
-          </a:p>
-          <a:p>
-            <a:pPr lvl="1"/>
-            <a:r>
-              <a:rPr lang="en-US" dirty="0">
-                <a:hlinkClick r:id="rId2"/>
-              </a:rPr>
-              <a:t>http://phet.colorado.edu/sims/charges-and-fields/charges-and-fields_en.html</a:t>
-            </a:r>
-            <a:endParaRPr lang="en-US" dirty="0"/>
-          </a:p>
-          <a:p>
-            <a:pPr lvl="1"/>
-            <a:endParaRPr lang="en-US" dirty="0"/>
-          </a:p>
-          <a:p>
-            <a:endParaRPr lang="en-US" dirty="0"/>
-          </a:p>
-          <a:p>
-            <a:endParaRPr lang="en-US" dirty="0"/>
-          </a:p>
-          <a:p>
-            <a:pPr>
-              <a:buNone/>
-            </a:pPr>
-            <a:endParaRPr lang="en-US" dirty="0"/>
-          </a:p>
-          <a:p>
-            <a:endParaRPr lang="en-US" dirty="0"/>
-          </a:p>
-          <a:p>
-            <a:pPr>
-              <a:buNone/>
-            </a:pPr>
-            <a:endParaRPr lang="en-US" dirty="0"/>
-          </a:p>
-          <a:p>
-            <a:endParaRPr lang="en-US" dirty="0"/>
-          </a:p>
-        </p:txBody>
-      </p:sp>
-      <p:pic>
-        <p:nvPicPr>
-          <p:cNvPr id="4" name="Picture 3"/>
-          <p:cNvPicPr>
-            <a:picLocks noChangeAspect="1"/>
-          </p:cNvPicPr>
-          <p:nvPr/>
-        </p:nvPicPr>
-        <p:blipFill>
-          <a:blip r:embed="rId3">
-            <a:extLst>
-              <a:ext uri="{28A0092B-C50C-407E-A947-70E740481C1C}">
-                <a14:useLocalDpi xmlns:a14="http://schemas.microsoft.com/office/drawing/2010/main" val="0"/>
-              </a:ext>
-            </a:extLst>
-          </a:blip>
-          <a:stretch>
-            <a:fillRect/>
-          </a:stretch>
-        </p:blipFill>
-        <p:spPr>
-          <a:xfrm>
-            <a:off x="5562600" y="841655"/>
-            <a:ext cx="2562225" cy="2562225"/>
-          </a:xfrm>
-          <a:prstGeom prst="rect">
-            <a:avLst/>
-          </a:prstGeom>
-        </p:spPr>
-      </p:pic>
-    </p:spTree>
-  </p:cSld>
-  <p:clrMapOvr>
-    <a:masterClrMapping/>
-  </p:clrMapOvr>
-</p:sld>
-</file>
-
-<file path=ppt/slides/slide20.xml><?xml version="1.0" encoding="utf-8"?>
-<p:sld xmlns:a="http://schemas.openxmlformats.org/drawingml/2006/main" xmlns:r="http://schemas.openxmlformats.org/officeDocument/2006/relationships" xmlns:p="http://schemas.openxmlformats.org/presentationml/2006/main">
-  <p:cSld>
-    <p:spTree>
-      <p:nvGrpSpPr>
-        <p:cNvPr id="1" name=""/>
-        <p:cNvGrpSpPr/>
-        <p:nvPr/>
-      </p:nvGrpSpPr>
-      <p:grpSpPr>
-        <a:xfrm>
-          <a:off x="0" y="0"/>
-          <a:ext cx="0" cy="0"/>
-          <a:chOff x="0" y="0"/>
-          <a:chExt cx="0" cy="0"/>
-        </a:xfrm>
-      </p:grpSpPr>
-      <p:sp>
-        <p:nvSpPr>
-          <p:cNvPr id="12290" name="Rectangle 2"/>
-          <p:cNvSpPr>
-            <a:spLocks noGrp="1" noChangeArrowheads="1"/>
-          </p:cNvSpPr>
-          <p:nvPr>
-            <p:ph type="title"/>
-          </p:nvPr>
-        </p:nvSpPr>
-        <p:spPr/>
-        <p:txBody>
-          <a:bodyPr/>
-          <a:lstStyle/>
-          <a:p>
-            <a:r>
-              <a:rPr lang="en-US" altLang="en-US"/>
-              <a:t>Electric Field</a:t>
-            </a:r>
-          </a:p>
-        </p:txBody>
-      </p:sp>
-      <p:sp>
-        <p:nvSpPr>
-          <p:cNvPr id="12291" name="Rectangle 3"/>
-          <p:cNvSpPr>
-            <a:spLocks noGrp="1" noChangeArrowheads="1"/>
-          </p:cNvSpPr>
-          <p:nvPr>
-            <p:ph type="body" idx="1"/>
-          </p:nvPr>
-        </p:nvSpPr>
-        <p:spPr/>
-        <p:txBody>
-          <a:bodyPr/>
-          <a:lstStyle/>
-          <a:p>
-            <a:pPr>
-              <a:lnSpc>
-                <a:spcPct val="90000"/>
-              </a:lnSpc>
-              <a:buFontTx/>
-              <a:buNone/>
-            </a:pPr>
-            <a:r>
-              <a:rPr lang="en-US" altLang="en-US"/>
-              <a:t>Electric field</a:t>
-            </a:r>
-          </a:p>
-          <a:p>
-            <a:pPr>
-              <a:lnSpc>
-                <a:spcPct val="90000"/>
-              </a:lnSpc>
-            </a:pPr>
-            <a:r>
-              <a:rPr lang="en-US" altLang="en-US" sz="2800"/>
-              <a:t>space surrounding an electric charge (an energetic aura)</a:t>
-            </a:r>
-          </a:p>
-          <a:p>
-            <a:pPr>
-              <a:lnSpc>
-                <a:spcPct val="90000"/>
-              </a:lnSpc>
-            </a:pPr>
-            <a:r>
-              <a:rPr lang="en-US" altLang="en-US" sz="2800"/>
-              <a:t>describes electric force</a:t>
-            </a:r>
-          </a:p>
-          <a:p>
-            <a:pPr>
-              <a:lnSpc>
-                <a:spcPct val="90000"/>
-              </a:lnSpc>
-            </a:pPr>
-            <a:r>
-              <a:rPr lang="en-US" altLang="en-US" sz="2800"/>
-              <a:t>around a charged particle obeys inverse-square law</a:t>
-            </a:r>
-          </a:p>
-          <a:p>
-            <a:pPr>
-              <a:lnSpc>
-                <a:spcPct val="90000"/>
-              </a:lnSpc>
-            </a:pPr>
-            <a:r>
-              <a:rPr lang="en-US" altLang="en-US" sz="2800"/>
-              <a:t>force per unit charge</a:t>
-            </a:r>
-          </a:p>
-          <a:p>
-            <a:pPr>
-              <a:lnSpc>
-                <a:spcPct val="90000"/>
-              </a:lnSpc>
-              <a:buFontTx/>
-              <a:buNone/>
-            </a:pPr>
-            <a:endParaRPr lang="en-US" altLang="en-US" sz="1800"/>
-          </a:p>
-          <a:p>
-            <a:pPr>
-              <a:lnSpc>
-                <a:spcPct val="90000"/>
-              </a:lnSpc>
-              <a:buFontTx/>
-              <a:buNone/>
-            </a:pPr>
-            <a:endParaRPr lang="en-US" altLang="en-US" sz="1800"/>
-          </a:p>
-          <a:p>
-            <a:pPr>
-              <a:lnSpc>
-                <a:spcPct val="90000"/>
-              </a:lnSpc>
-              <a:buFontTx/>
-              <a:buNone/>
-            </a:pPr>
-            <a:br>
-              <a:rPr lang="en-US" altLang="en-US" sz="1800"/>
-            </a:br>
-            <a:endParaRPr lang="en-US" altLang="en-US" sz="2800"/>
-          </a:p>
-        </p:txBody>
-      </p:sp>
-      <p:pic>
-        <p:nvPicPr>
-          <p:cNvPr id="12292" name="Picture 4" descr="10_08Figure-F"/>
-          <p:cNvPicPr>
-            <a:picLocks noChangeAspect="1" noChangeArrowheads="1"/>
-          </p:cNvPicPr>
-          <p:nvPr/>
-        </p:nvPicPr>
-        <p:blipFill>
-          <a:blip r:embed="rId2" cstate="print">
-            <a:extLst>
-              <a:ext uri="{28A0092B-C50C-407E-A947-70E740481C1C}">
-                <a14:useLocalDpi xmlns:a14="http://schemas.microsoft.com/office/drawing/2010/main" val="0"/>
-              </a:ext>
-            </a:extLst>
-          </a:blip>
-          <a:srcRect b="2773"/>
-          <a:stretch>
-            <a:fillRect/>
-          </a:stretch>
-        </p:blipFill>
-        <p:spPr bwMode="auto">
-          <a:xfrm>
-            <a:off x="5203825" y="3962400"/>
-            <a:ext cx="2720975" cy="2587625"/>
-          </a:xfrm>
-          <a:prstGeom prst="rect">
-            <a:avLst/>
-          </a:prstGeom>
-          <a:noFill/>
-          <a:extLst>
-            <a:ext uri="{909E8E84-426E-40DD-AFC4-6F175D3DCCD1}">
-              <a14:hiddenFill xmlns:a14="http://schemas.microsoft.com/office/drawing/2010/main">
-                <a:solidFill>
-                  <a:srgbClr val="FFFFFF"/>
-                </a:solidFill>
-              </a14:hiddenFill>
-            </a:ext>
-          </a:extLst>
-        </p:spPr>
-      </p:pic>
-    </p:spTree>
-    <p:extLst>
-      <p:ext uri="{BB962C8B-B14F-4D97-AF65-F5344CB8AC3E}">
-        <p14:creationId xmlns:p14="http://schemas.microsoft.com/office/powerpoint/2010/main" val="4217775967"/>
-      </p:ext>
-    </p:extLst>
-  </p:cSld>
-  <p:clrMapOvr>
-    <a:masterClrMapping/>
-  </p:clrMapOvr>
-</p:sld>
-</file>
-
-<file path=ppt/slides/slide21.xml><?xml version="1.0" encoding="utf-8"?>
-<p:sld xmlns:a="http://schemas.openxmlformats.org/drawingml/2006/main" xmlns:r="http://schemas.openxmlformats.org/officeDocument/2006/relationships" xmlns:p="http://schemas.openxmlformats.org/presentationml/2006/main">
-  <p:cSld>
-    <p:spTree>
-      <p:nvGrpSpPr>
-        <p:cNvPr id="1" name=""/>
-        <p:cNvGrpSpPr/>
-        <p:nvPr/>
-      </p:nvGrpSpPr>
-      <p:grpSpPr>
-        <a:xfrm>
-          <a:off x="0" y="0"/>
-          <a:ext cx="0" cy="0"/>
-          <a:chOff x="0" y="0"/>
-          <a:chExt cx="0" cy="0"/>
-        </a:xfrm>
-      </p:grpSpPr>
-      <p:sp>
-        <p:nvSpPr>
-          <p:cNvPr id="41986" name="Rectangle 2"/>
-          <p:cNvSpPr>
-            <a:spLocks noGrp="1" noChangeArrowheads="1"/>
-          </p:cNvSpPr>
-          <p:nvPr>
-            <p:ph type="title"/>
-          </p:nvPr>
-        </p:nvSpPr>
-        <p:spPr/>
-        <p:txBody>
-          <a:bodyPr/>
-          <a:lstStyle/>
-          <a:p>
-            <a:r>
-              <a:rPr lang="en-US" altLang="en-US"/>
-              <a:t>Electric Field</a:t>
-            </a:r>
-          </a:p>
-        </p:txBody>
-      </p:sp>
-      <p:sp>
-        <p:nvSpPr>
-          <p:cNvPr id="41987" name="Rectangle 3"/>
-          <p:cNvSpPr>
-            <a:spLocks noGrp="1" noChangeArrowheads="1"/>
-          </p:cNvSpPr>
-          <p:nvPr>
-            <p:ph type="body" idx="1"/>
-          </p:nvPr>
-        </p:nvSpPr>
-        <p:spPr/>
-        <p:txBody>
-          <a:bodyPr/>
-          <a:lstStyle/>
-          <a:p>
-            <a:pPr>
-              <a:buFontTx/>
-              <a:buNone/>
-            </a:pPr>
-            <a:r>
-              <a:rPr lang="en-US" altLang="en-US"/>
-              <a:t>Electric field direction</a:t>
-            </a:r>
-          </a:p>
-          <a:p>
-            <a:r>
-              <a:rPr lang="en-US" altLang="en-US" sz="2800"/>
-              <a:t>same direction as the force on a positive charge</a:t>
-            </a:r>
-          </a:p>
-          <a:p>
-            <a:r>
-              <a:rPr lang="en-US" altLang="en-US" sz="2800"/>
-              <a:t>opposite direction to the force on an electron</a:t>
-            </a:r>
-          </a:p>
-          <a:p>
-            <a:endParaRPr lang="en-US" altLang="en-US" sz="2800"/>
-          </a:p>
-          <a:p>
-            <a:endParaRPr lang="en-US" altLang="en-US" sz="2800"/>
-          </a:p>
-          <a:p>
-            <a:endParaRPr lang="en-US" altLang="en-US" sz="2800"/>
-          </a:p>
-          <a:p>
-            <a:endParaRPr lang="en-US" altLang="en-US" sz="2800"/>
-          </a:p>
-          <a:p>
-            <a:pPr>
-              <a:buFontTx/>
-              <a:buNone/>
-            </a:pPr>
-            <a:r>
-              <a:rPr lang="en-US" altLang="en-US" sz="2800"/>
-              <a:t>	</a:t>
-            </a:r>
-          </a:p>
-        </p:txBody>
-      </p:sp>
-      <p:pic>
-        <p:nvPicPr>
-          <p:cNvPr id="41988" name="Picture 4" descr="10_09FigureA-F"/>
-          <p:cNvPicPr>
-            <a:picLocks noChangeAspect="1" noChangeArrowheads="1"/>
-          </p:cNvPicPr>
-          <p:nvPr/>
-        </p:nvPicPr>
-        <p:blipFill>
-          <a:blip r:embed="rId2" cstate="print">
-            <a:extLst>
-              <a:ext uri="{28A0092B-C50C-407E-A947-70E740481C1C}">
-                <a14:useLocalDpi xmlns:a14="http://schemas.microsoft.com/office/drawing/2010/main" val="0"/>
-              </a:ext>
-            </a:extLst>
-          </a:blip>
-          <a:srcRect b="20453"/>
-          <a:stretch>
-            <a:fillRect/>
-          </a:stretch>
-        </p:blipFill>
-        <p:spPr bwMode="auto">
-          <a:xfrm>
-            <a:off x="2870200" y="3225800"/>
-            <a:ext cx="3225800" cy="3251200"/>
-          </a:xfrm>
-          <a:prstGeom prst="rect">
-            <a:avLst/>
-          </a:prstGeom>
-          <a:noFill/>
-          <a:extLst>
-            <a:ext uri="{909E8E84-426E-40DD-AFC4-6F175D3DCCD1}">
-              <a14:hiddenFill xmlns:a14="http://schemas.microsoft.com/office/drawing/2010/main">
-                <a:solidFill>
-                  <a:srgbClr val="FFFFFF"/>
-                </a:solidFill>
-              </a14:hiddenFill>
-            </a:ext>
-          </a:extLst>
-        </p:spPr>
-      </p:pic>
-    </p:spTree>
-    <p:extLst>
-      <p:ext uri="{BB962C8B-B14F-4D97-AF65-F5344CB8AC3E}">
-        <p14:creationId xmlns:p14="http://schemas.microsoft.com/office/powerpoint/2010/main" val="1446191932"/>
+        <p14:creationId xmlns:p14="http://schemas.microsoft.com/office/powerpoint/2010/main" val="369029187"/>
       </p:ext>
     </p:extLst>
   </p:cSld>
@@ -7299,7 +7604,7 @@
           <a:lstStyle/>
           <a:p>
             <a:r>
-              <a:rPr lang="en-US" altLang="en-US"/>
+              <a:rPr lang="en-US" altLang="en-US" dirty="0"/>
               <a:t>Course Modules</a:t>
             </a:r>
           </a:p>
@@ -8315,18 +8620,18 @@
           </a:lstStyle>
           <a:p>
             <a:r>
-              <a:rPr lang="en-US" altLang="en-US"/>
+              <a:rPr lang="en-US" altLang="en-US" dirty="0"/>
               <a:t>* </a:t>
             </a:r>
             <a:r>
-              <a:rPr lang="en-US" altLang="en-US" sz="1600" b="1">
+              <a:rPr lang="en-US" altLang="en-US" sz="1600" b="1" dirty="0">
                 <a:solidFill>
                   <a:schemeClr val="bg2"/>
                 </a:solidFill>
               </a:rPr>
               <a:t>it is strongly recommended you read chapters 0 - 3</a:t>
             </a:r>
-            <a:endParaRPr lang="en-US" altLang="en-US" sz="1600" b="1"/>
+            <a:endParaRPr lang="en-US" altLang="en-US" sz="1600" b="1" dirty="0"/>
           </a:p>
         </p:txBody>
       </p:sp>
@@ -8449,27 +8754,21 @@
           <a:p>
             <a:r>
               <a:rPr lang="en-US" dirty="0"/>
-              <a:t>Discussion 2– due tonight (5%)</a:t>
-            </a:r>
-          </a:p>
-          <a:p>
+              <a:t>Labs </a:t>
+            </a:r>
+          </a:p>
+          <a:p>
+            <a:pPr lvl="1"/>
+            <a:r>
+              <a:rPr lang="en-US" b="1" dirty="0"/>
+              <a:t>Electricity (3.75%)</a:t>
+            </a:r>
+          </a:p>
+          <a:p>
+            <a:pPr lvl="1"/>
             <a:r>
               <a:rPr lang="en-US" dirty="0"/>
-              <a:t>Labs </a:t>
-            </a:r>
-          </a:p>
-          <a:p>
-            <a:pPr lvl="1"/>
-            <a:r>
-              <a:rPr lang="en-US" dirty="0"/>
-              <a:t>Gas Properties (3.75%)</a:t>
-            </a:r>
-          </a:p>
-          <a:p>
-            <a:pPr lvl="1"/>
-            <a:r>
-              <a:rPr lang="en-US" dirty="0"/>
-              <a:t>Temperature and Heat (3.75%)</a:t>
+              <a:t>Electromagnetic Lab (3.75%)</a:t>
             </a:r>
           </a:p>
           <a:p>
@@ -8539,7 +8838,7 @@
           <a:lstStyle/>
           <a:p>
             <a:r>
-              <a:rPr lang="en-US" altLang="en-US"/>
+              <a:rPr lang="en-US" altLang="en-US" dirty="0"/>
               <a:t>Electric Force and Charge</a:t>
             </a:r>
           </a:p>
@@ -8781,7 +9080,7 @@
           <a:lstStyle/>
           <a:p>
             <a:r>
-              <a:rPr lang="en-US" altLang="en-US"/>
+              <a:rPr lang="en-US" altLang="en-US" dirty="0"/>
               <a:t>Electric Force and Charge</a:t>
             </a:r>
           </a:p>
@@ -8799,7 +9098,7 @@
         </p:nvSpPr>
         <p:spPr>
           <a:xfrm>
-            <a:off x="457200" y="1143000"/>
+            <a:off x="457200" y="1189037"/>
             <a:ext cx="8229600" cy="4525963"/>
           </a:xfrm>
         </p:spPr>
@@ -8857,9 +9156,6 @@
               <a:rPr lang="en-US" altLang="en-US" sz="2800" dirty="0"/>
               <a:t>positives</a:t>
             </a:r>
-            <a:br>
-              <a:rPr lang="en-US" altLang="en-US" sz="1800" dirty="0"/>
-            </a:br>
             <a:endParaRPr lang="en-US" altLang="en-US" sz="1800" dirty="0"/>
           </a:p>
           <a:p>
@@ -8883,43 +9179,32 @@
       </p:sp>
       <p:pic>
         <p:nvPicPr>
-          <p:cNvPr id="8196" name="Picture 4" descr="10_02Figure-F"/>
+          <p:cNvPr id="5" name="Picture 4"/>
           <p:cNvPicPr>
-            <a:picLocks noChangeAspect="1" noChangeArrowheads="1"/>
+            <a:picLocks noChangeAspect="1"/>
           </p:cNvPicPr>
           <p:nvPr/>
         </p:nvPicPr>
         <p:blipFill>
-          <a:blip r:embed="rId2" cstate="print">
+          <a:blip r:embed="rId2">
             <a:extLst>
               <a:ext uri="{28A0092B-C50C-407E-A947-70E740481C1C}">
                 <a14:useLocalDpi xmlns:a14="http://schemas.microsoft.com/office/drawing/2010/main" val="0"/>
               </a:ext>
             </a:extLst>
           </a:blip>
-          <a:srcRect b="2531"/>
           <a:stretch>
             <a:fillRect/>
           </a:stretch>
         </p:blipFill>
-        <p:spPr bwMode="auto">
+        <p:spPr>
           <a:xfrm>
-            <a:off x="5562600" y="3962400"/>
-            <a:ext cx="2895600" cy="2565400"/>
+            <a:off x="5486400" y="3458827"/>
+            <a:ext cx="3124200" cy="2808624"/>
           </a:xfrm>
           <a:prstGeom prst="rect">
             <a:avLst/>
           </a:prstGeom>
-          <a:noFill/>
-          <a:extLst>
-            <a:ext uri="{909E8E84-426E-40DD-AFC4-6F175D3DCCD1}">
-              <a14:hiddenFill xmlns:a14="http://schemas.microsoft.com/office/drawing/2010/main">
-                <a:solidFill>
-                  <a:srgbClr val="FFFFFF"/>
-                </a:solidFill>
-              </a14:hiddenFill>
-            </a:ext>
-          </a:extLst>
         </p:spPr>
       </p:pic>
     </p:spTree>
@@ -8968,7 +9253,7 @@
           <a:lstStyle/>
           <a:p>
             <a:r>
-              <a:rPr lang="en-US" altLang="en-US"/>
+              <a:rPr lang="en-US" altLang="en-US" dirty="0"/>
               <a:t>Electric Force and Charge</a:t>
             </a:r>
           </a:p>
@@ -8984,7 +9269,12 @@
             <p:ph type="body" idx="1"/>
           </p:nvPr>
         </p:nvSpPr>
-        <p:spPr/>
+        <p:spPr>
+          <a:xfrm>
+            <a:off x="457200" y="892748"/>
+            <a:ext cx="8229600" cy="4530725"/>
+          </a:xfrm>
+        </p:spPr>
         <p:txBody>
           <a:bodyPr/>
           <a:lstStyle/>
@@ -8994,7 +9284,7 @@
               <a:buNone/>
             </a:pPr>
             <a:r>
-              <a:rPr lang="en-US" altLang="en-US"/>
+              <a:rPr lang="en-US" altLang="en-US" dirty="0"/>
               <a:t>Fundamental facts about atoms</a:t>
             </a:r>
           </a:p>
@@ -9004,7 +9294,7 @@
               <a:buNone/>
             </a:pPr>
             <a:r>
-              <a:rPr lang="en-US" altLang="en-US" sz="2800"/>
+              <a:rPr lang="en-US" altLang="en-US" sz="2800" dirty="0"/>
               <a:t>	1. Every atom is composed of a positively charged nucleus surrounded by negatively charged electrons.</a:t>
             </a:r>
           </a:p>
@@ -9014,12 +9304,72 @@
               <a:buNone/>
             </a:pPr>
             <a:r>
-              <a:rPr lang="en-US" altLang="en-US" sz="2800"/>
-              <a:t>	2. Each of the electrons in any atom has the same quantity of negative charge and the same mass.</a:t>
-            </a:r>
-          </a:p>
-        </p:txBody>
-      </p:sp>
+              <a:rPr lang="en-US" altLang="en-US" sz="2800" dirty="0"/>
+              <a:t>	2. Each of the electrons in any atom normally has the same quantity of negative charge and the same mass.</a:t>
+            </a:r>
+          </a:p>
+        </p:txBody>
+      </p:sp>
+      <p:pic>
+        <p:nvPicPr>
+          <p:cNvPr id="2" name="Picture 1"/>
+          <p:cNvPicPr>
+            <a:picLocks noChangeAspect="1"/>
+          </p:cNvPicPr>
+          <p:nvPr/>
+        </p:nvPicPr>
+        <p:blipFill>
+          <a:blip r:embed="rId2">
+            <a:extLst>
+              <a:ext uri="{28A0092B-C50C-407E-A947-70E740481C1C}">
+                <a14:useLocalDpi xmlns:a14="http://schemas.microsoft.com/office/drawing/2010/main" val="0"/>
+              </a:ext>
+            </a:extLst>
+          </a:blip>
+          <a:stretch>
+            <a:fillRect/>
+          </a:stretch>
+        </p:blipFill>
+        <p:spPr>
+          <a:xfrm>
+            <a:off x="1752600" y="4253017"/>
+            <a:ext cx="1885950" cy="1695450"/>
+          </a:xfrm>
+          <a:prstGeom prst="rect">
+            <a:avLst/>
+          </a:prstGeom>
+        </p:spPr>
+      </p:pic>
+      <p:pic>
+        <p:nvPicPr>
+          <p:cNvPr id="3" name="Picture 2"/>
+          <p:cNvPicPr>
+            <a:picLocks noChangeAspect="1"/>
+          </p:cNvPicPr>
+          <p:nvPr/>
+        </p:nvPicPr>
+        <p:blipFill>
+          <a:blip r:embed="rId3">
+            <a:extLst>
+              <a:ext uri="{28A0092B-C50C-407E-A947-70E740481C1C}">
+                <a14:useLocalDpi xmlns:a14="http://schemas.microsoft.com/office/drawing/2010/main" val="0"/>
+              </a:ext>
+            </a:extLst>
+          </a:blip>
+          <a:stretch>
+            <a:fillRect/>
+          </a:stretch>
+        </p:blipFill>
+        <p:spPr>
+          <a:xfrm>
+            <a:off x="5181600" y="4128933"/>
+            <a:ext cx="2142482" cy="1819534"/>
+          </a:xfrm>
+          <a:prstGeom prst="rect">
+            <a:avLst/>
+          </a:prstGeom>
+        </p:spPr>
+      </p:pic>
     </p:spTree>
     <p:extLst>
       <p:ext uri="{BB962C8B-B14F-4D97-AF65-F5344CB8AC3E}">
@@ -9066,7 +9416,7 @@
           <a:lstStyle/>
           <a:p>
             <a:r>
-              <a:rPr lang="en-US" altLang="en-US"/>
+              <a:rPr lang="en-US" altLang="en-US" dirty="0"/>
               <a:t>Electric Force and Charge</a:t>
             </a:r>
           </a:p>
@@ -9082,7 +9432,12 @@
             <p:ph type="body" idx="1"/>
           </p:nvPr>
         </p:nvSpPr>
-        <p:spPr/>
+        <p:spPr>
+          <a:xfrm>
+            <a:off x="457200" y="1219200"/>
+            <a:ext cx="8229600" cy="4530725"/>
+          </a:xfrm>
+        </p:spPr>
         <p:txBody>
           <a:bodyPr/>
           <a:lstStyle/>
@@ -9092,7 +9447,7 @@
               <a:buNone/>
             </a:pPr>
             <a:r>
-              <a:rPr lang="en-US" altLang="en-US"/>
+              <a:rPr lang="en-US" altLang="en-US" dirty="0"/>
               <a:t>Fundamental facts about atoms (continued)</a:t>
             </a:r>
           </a:p>
@@ -9102,8 +9457,16 @@
               <a:buNone/>
             </a:pPr>
             <a:r>
-              <a:rPr lang="en-US" altLang="en-US" sz="2800"/>
-              <a:t>	3. Protons and neutrons compose the nucleus. Protons are about 1800 times more massive than electrons, but each one carries an amount of positive charge equal to the negative charge of electrons. Neutrons have slightly more mass than protons and have no net charge.</a:t>
+              <a:rPr lang="en-US" altLang="en-US" sz="2800" dirty="0"/>
+              <a:t>	3. Protons and neutrons compose the nucleus. Protons are about </a:t>
+            </a:r>
+            <a:r>
+              <a:rPr lang="en-US" altLang="en-US" sz="2800" b="1" dirty="0"/>
+              <a:t>1800</a:t>
+            </a:r>
+            <a:r>
+              <a:rPr lang="en-US" altLang="en-US" sz="2800" dirty="0"/>
+              <a:t> times more massive than electrons, but each one carries an amount of positive charge equal to the negative charge of electrons. Neutrons have slightly more mass than protons and have no net charge.</a:t>
             </a:r>
           </a:p>
           <a:p>
@@ -9112,7 +9475,7 @@
               <a:buNone/>
             </a:pPr>
             <a:r>
-              <a:rPr lang="en-US" altLang="en-US" sz="2800"/>
+              <a:rPr lang="en-US" altLang="en-US" sz="2800" dirty="0"/>
               <a:t>	4. Atoms usually have as many electrons as protons, so the atom has zero net charge.</a:t>
             </a:r>
           </a:p>
@@ -9164,7 +9527,7 @@
           <a:lstStyle/>
           <a:p>
             <a:r>
-              <a:rPr lang="en-US" altLang="en-US"/>
+              <a:rPr lang="en-US" altLang="en-US" dirty="0"/>
               <a:t>Electric Force and Charge</a:t>
             </a:r>
           </a:p>
@@ -9180,7 +9543,12 @@
             <p:ph type="body" idx="1"/>
           </p:nvPr>
         </p:nvSpPr>
-        <p:spPr/>
+        <p:spPr>
+          <a:xfrm>
+            <a:off x="457200" y="1413890"/>
+            <a:ext cx="8229600" cy="4530725"/>
+          </a:xfrm>
+        </p:spPr>
         <p:txBody>
           <a:bodyPr/>
           <a:lstStyle/>
@@ -9190,24 +9558,54 @@
               <a:buNone/>
             </a:pPr>
             <a:r>
-              <a:rPr lang="en-US" altLang="en-US"/>
+              <a:rPr lang="en-US" altLang="en-US" b="1" dirty="0"/>
               <a:t>Ion</a:t>
             </a:r>
           </a:p>
           <a:p>
             <a:r>
-              <a:rPr lang="en-US" altLang="en-US" sz="2800"/>
+              <a:rPr lang="en-US" altLang="en-US" sz="2800" dirty="0"/>
               <a:t>positive ion—atom losing one or more electrons has positive net charge</a:t>
             </a:r>
           </a:p>
           <a:p>
             <a:r>
-              <a:rPr lang="en-US" altLang="en-US" sz="2800"/>
+              <a:rPr lang="en-US" altLang="en-US" sz="2800" dirty="0"/>
               <a:t>negative ion—atom gaining one or more electrons has negative net charge</a:t>
             </a:r>
           </a:p>
         </p:txBody>
       </p:sp>
+      <p:pic>
+        <p:nvPicPr>
+          <p:cNvPr id="2" name="Picture 1"/>
+          <p:cNvPicPr>
+            <a:picLocks noChangeAspect="1"/>
+          </p:cNvPicPr>
+          <p:nvPr/>
+        </p:nvPicPr>
+        <p:blipFill>
+          <a:blip r:embed="rId2">
+            <a:extLst>
+              <a:ext uri="{28A0092B-C50C-407E-A947-70E740481C1C}">
+                <a14:useLocalDpi xmlns:a14="http://schemas.microsoft.com/office/drawing/2010/main" val="0"/>
+              </a:ext>
+            </a:extLst>
+          </a:blip>
+          <a:stretch>
+            <a:fillRect/>
+          </a:stretch>
+        </p:blipFill>
+        <p:spPr>
+          <a:xfrm>
+            <a:off x="2209800" y="4495800"/>
+            <a:ext cx="4333875" cy="971550"/>
+          </a:xfrm>
+          <a:prstGeom prst="rect">
+            <a:avLst/>
+          </a:prstGeom>
+        </p:spPr>
+      </p:pic>
     </p:spTree>
     <p:extLst>
       <p:ext uri="{BB962C8B-B14F-4D97-AF65-F5344CB8AC3E}">

</xml_diff>